<commit_message>
Add Problem Statement and proposed Solution
</commit_message>
<xml_diff>
--- a/4- Idea Evaluation/Idea Evaluation Slides - Working Draft.pptx
+++ b/4- Idea Evaluation/Idea Evaluation Slides - Working Draft.pptx
@@ -5,7 +5,7 @@
     <p:sldMasterId id="2147483648" r:id="rId1"/>
   </p:sldMasterIdLst>
   <p:notesMasterIdLst>
-    <p:notesMasterId r:id="rId29"/>
+    <p:notesMasterId r:id="rId32"/>
   </p:notesMasterIdLst>
   <p:sldIdLst>
     <p:sldId id="258" r:id="rId2"/>
@@ -26,15 +26,18 @@
     <p:sldId id="264" r:id="rId17"/>
     <p:sldId id="283" r:id="rId18"/>
     <p:sldId id="265" r:id="rId19"/>
-    <p:sldId id="262" r:id="rId20"/>
-    <p:sldId id="266" r:id="rId21"/>
-    <p:sldId id="267" r:id="rId22"/>
-    <p:sldId id="284" r:id="rId23"/>
-    <p:sldId id="287" r:id="rId24"/>
-    <p:sldId id="286" r:id="rId25"/>
-    <p:sldId id="268" r:id="rId26"/>
-    <p:sldId id="261" r:id="rId27"/>
-    <p:sldId id="269" r:id="rId28"/>
+    <p:sldId id="288" r:id="rId20"/>
+    <p:sldId id="262" r:id="rId21"/>
+    <p:sldId id="289" r:id="rId22"/>
+    <p:sldId id="290" r:id="rId23"/>
+    <p:sldId id="266" r:id="rId24"/>
+    <p:sldId id="267" r:id="rId25"/>
+    <p:sldId id="284" r:id="rId26"/>
+    <p:sldId id="287" r:id="rId27"/>
+    <p:sldId id="286" r:id="rId28"/>
+    <p:sldId id="268" r:id="rId29"/>
+    <p:sldId id="261" r:id="rId30"/>
+    <p:sldId id="269" r:id="rId31"/>
   </p:sldIdLst>
   <p:sldSz cx="12192000" cy="6858000"/>
   <p:notesSz cx="6858000" cy="9144000"/>
@@ -223,7 +226,7 @@
           <a:p>
             <a:fld id="{EF96ACE9-C9FC-4287-B6B2-A985566C0C1D}" type="datetimeFigureOut">
               <a:rPr lang="en-US" smtClean="0"/>
-              <a:t>9/27/2024</a:t>
+              <a:t>9/28/2024</a:t>
             </a:fld>
             <a:endParaRPr lang="en-US"/>
           </a:p>
@@ -787,7 +790,7 @@
           <a:p>
             <a:fld id="{0F5A5E6E-0E5C-41E1-A40C-15B94255FA15}" type="datetimeFigureOut">
               <a:rPr lang="en-US" smtClean="0"/>
-              <a:t>9/27/2024</a:t>
+              <a:t>9/28/2024</a:t>
             </a:fld>
             <a:endParaRPr lang="en-US"/>
           </a:p>
@@ -955,7 +958,7 @@
           <a:p>
             <a:fld id="{0F5A5E6E-0E5C-41E1-A40C-15B94255FA15}" type="datetimeFigureOut">
               <a:rPr lang="en-US" smtClean="0"/>
-              <a:t>9/27/2024</a:t>
+              <a:t>9/28/2024</a:t>
             </a:fld>
             <a:endParaRPr lang="en-US"/>
           </a:p>
@@ -1133,7 +1136,7 @@
           <a:p>
             <a:fld id="{0F5A5E6E-0E5C-41E1-A40C-15B94255FA15}" type="datetimeFigureOut">
               <a:rPr lang="en-US" smtClean="0"/>
-              <a:t>9/27/2024</a:t>
+              <a:t>9/28/2024</a:t>
             </a:fld>
             <a:endParaRPr lang="en-US"/>
           </a:p>
@@ -1301,7 +1304,7 @@
           <a:p>
             <a:fld id="{0F5A5E6E-0E5C-41E1-A40C-15B94255FA15}" type="datetimeFigureOut">
               <a:rPr lang="en-US" smtClean="0"/>
-              <a:t>9/27/2024</a:t>
+              <a:t>9/28/2024</a:t>
             </a:fld>
             <a:endParaRPr lang="en-US"/>
           </a:p>
@@ -1546,7 +1549,7 @@
           <a:p>
             <a:fld id="{0F5A5E6E-0E5C-41E1-A40C-15B94255FA15}" type="datetimeFigureOut">
               <a:rPr lang="en-US" smtClean="0"/>
-              <a:t>9/27/2024</a:t>
+              <a:t>9/28/2024</a:t>
             </a:fld>
             <a:endParaRPr lang="en-US"/>
           </a:p>
@@ -1775,7 +1778,7 @@
           <a:p>
             <a:fld id="{0F5A5E6E-0E5C-41E1-A40C-15B94255FA15}" type="datetimeFigureOut">
               <a:rPr lang="en-US" smtClean="0"/>
-              <a:t>9/27/2024</a:t>
+              <a:t>9/28/2024</a:t>
             </a:fld>
             <a:endParaRPr lang="en-US"/>
           </a:p>
@@ -2139,7 +2142,7 @@
           <a:p>
             <a:fld id="{0F5A5E6E-0E5C-41E1-A40C-15B94255FA15}" type="datetimeFigureOut">
               <a:rPr lang="en-US" smtClean="0"/>
-              <a:t>9/27/2024</a:t>
+              <a:t>9/28/2024</a:t>
             </a:fld>
             <a:endParaRPr lang="en-US"/>
           </a:p>
@@ -2256,7 +2259,7 @@
           <a:p>
             <a:fld id="{0F5A5E6E-0E5C-41E1-A40C-15B94255FA15}" type="datetimeFigureOut">
               <a:rPr lang="en-US" smtClean="0"/>
-              <a:t>9/27/2024</a:t>
+              <a:t>9/28/2024</a:t>
             </a:fld>
             <a:endParaRPr lang="en-US"/>
           </a:p>
@@ -2351,7 +2354,7 @@
           <a:p>
             <a:fld id="{0F5A5E6E-0E5C-41E1-A40C-15B94255FA15}" type="datetimeFigureOut">
               <a:rPr lang="en-US" smtClean="0"/>
-              <a:t>9/27/2024</a:t>
+              <a:t>9/28/2024</a:t>
             </a:fld>
             <a:endParaRPr lang="en-US"/>
           </a:p>
@@ -2626,7 +2629,7 @@
           <a:p>
             <a:fld id="{0F5A5E6E-0E5C-41E1-A40C-15B94255FA15}" type="datetimeFigureOut">
               <a:rPr lang="en-US" smtClean="0"/>
-              <a:t>9/27/2024</a:t>
+              <a:t>9/28/2024</a:t>
             </a:fld>
             <a:endParaRPr lang="en-US"/>
           </a:p>
@@ -2878,7 +2881,7 @@
           <a:p>
             <a:fld id="{0F5A5E6E-0E5C-41E1-A40C-15B94255FA15}" type="datetimeFigureOut">
               <a:rPr lang="en-US" smtClean="0"/>
-              <a:t>9/27/2024</a:t>
+              <a:t>9/28/2024</a:t>
             </a:fld>
             <a:endParaRPr lang="en-US"/>
           </a:p>
@@ -3089,7 +3092,7 @@
           <a:p>
             <a:fld id="{0F5A5E6E-0E5C-41E1-A40C-15B94255FA15}" type="datetimeFigureOut">
               <a:rPr lang="en-US" smtClean="0"/>
-              <a:t>9/27/2024</a:t>
+              <a:t>9/28/2024</a:t>
             </a:fld>
             <a:endParaRPr lang="en-US"/>
           </a:p>
@@ -3971,8 +3974,8 @@
         </p:nvSpPr>
         <p:spPr>
           <a:xfrm>
-            <a:off x="838200" y="1346083"/>
-            <a:ext cx="10515600" cy="5511915"/>
+            <a:off x="929640" y="1346083"/>
+            <a:ext cx="10332720" cy="5511915"/>
           </a:xfrm>
         </p:spPr>
         <p:txBody>
@@ -4007,7 +4010,7 @@
             </a:pPr>
             <a:r>
               <a:rPr lang="en-US" dirty="0"/>
-              <a:t>Lacks features for virtual engagement (like virtual meetups / surveys).</a:t>
+              <a:t>Lacks features for virtual engagement (like virtual meetup / surveys).</a:t>
             </a:r>
           </a:p>
           <a:p>
@@ -4171,8 +4174,8 @@
         </p:nvSpPr>
         <p:spPr>
           <a:xfrm>
-            <a:off x="838200" y="1990166"/>
-            <a:ext cx="10515600" cy="4867834"/>
+            <a:off x="929640" y="1990166"/>
+            <a:ext cx="10332720" cy="4867834"/>
           </a:xfrm>
         </p:spPr>
         <p:txBody>
@@ -4290,8 +4293,8 @@
         </p:nvSpPr>
         <p:spPr>
           <a:xfrm>
-            <a:off x="838200" y="1150051"/>
-            <a:ext cx="10515600" cy="959083"/>
+            <a:off x="929640" y="1150051"/>
+            <a:ext cx="10332720" cy="959083"/>
           </a:xfrm>
           <a:prstGeom prst="rect">
             <a:avLst/>
@@ -4405,8 +4408,8 @@
         </p:nvSpPr>
         <p:spPr>
           <a:xfrm>
-            <a:off x="838200" y="1346083"/>
-            <a:ext cx="10515600" cy="5511915"/>
+            <a:off x="929640" y="1346083"/>
+            <a:ext cx="10332720" cy="5511915"/>
           </a:xfrm>
         </p:spPr>
         <p:txBody>
@@ -4605,8 +4608,8 @@
         </p:nvSpPr>
         <p:spPr>
           <a:xfrm>
-            <a:off x="838200" y="1990166"/>
-            <a:ext cx="10515600" cy="4867834"/>
+            <a:off x="929640" y="1990166"/>
+            <a:ext cx="10332720" cy="4867834"/>
           </a:xfrm>
         </p:spPr>
         <p:txBody>
@@ -4724,8 +4727,8 @@
         </p:nvSpPr>
         <p:spPr>
           <a:xfrm>
-            <a:off x="838200" y="1150051"/>
-            <a:ext cx="10515600" cy="959083"/>
+            <a:off x="929640" y="1150051"/>
+            <a:ext cx="10332720" cy="959083"/>
           </a:xfrm>
           <a:prstGeom prst="rect">
             <a:avLst/>
@@ -4839,8 +4842,8 @@
         </p:nvSpPr>
         <p:spPr>
           <a:xfrm>
-            <a:off x="838200" y="1346083"/>
-            <a:ext cx="10515600" cy="5511915"/>
+            <a:off x="929640" y="1346083"/>
+            <a:ext cx="10332720" cy="5511915"/>
           </a:xfrm>
         </p:spPr>
         <p:txBody>
@@ -5034,8 +5037,8 @@
         </p:nvSpPr>
         <p:spPr>
           <a:xfrm>
-            <a:off x="838200" y="1990166"/>
-            <a:ext cx="10515600" cy="4867834"/>
+            <a:off x="929640" y="1990166"/>
+            <a:ext cx="10332720" cy="4867834"/>
           </a:xfrm>
         </p:spPr>
         <p:txBody>
@@ -5166,8 +5169,8 @@
         </p:nvSpPr>
         <p:spPr>
           <a:xfrm>
-            <a:off x="838200" y="1150051"/>
-            <a:ext cx="10515600" cy="959083"/>
+            <a:off x="929640" y="1150051"/>
+            <a:ext cx="10332720" cy="959083"/>
           </a:xfrm>
           <a:prstGeom prst="rect">
             <a:avLst/>
@@ -6383,6 +6386,260 @@
             <p:ph type="title"/>
           </p:nvPr>
         </p:nvSpPr>
+        <p:spPr>
+          <a:xfrm>
+            <a:off x="838200" y="365125"/>
+            <a:ext cx="10515600" cy="980959"/>
+          </a:xfrm>
+        </p:spPr>
+        <p:txBody>
+          <a:bodyPr/>
+          <a:lstStyle/>
+          <a:p>
+            <a:r>
+              <a:rPr lang="en-US" b="1" dirty="0">
+                <a:solidFill>
+                  <a:srgbClr val="36ABF3"/>
+                </a:solidFill>
+              </a:rPr>
+              <a:t>Problem Statement</a:t>
+            </a:r>
+          </a:p>
+        </p:txBody>
+      </p:sp>
+      <p:sp>
+        <p:nvSpPr>
+          <p:cNvPr id="3" name="Content Placeholder 2"/>
+          <p:cNvSpPr>
+            <a:spLocks noGrp="1"/>
+          </p:cNvSpPr>
+          <p:nvPr>
+            <p:ph idx="1"/>
+          </p:nvPr>
+        </p:nvSpPr>
+        <p:spPr>
+          <a:xfrm>
+            <a:off x="929640" y="1506072"/>
+            <a:ext cx="10332720" cy="4867834"/>
+          </a:xfrm>
+        </p:spPr>
+        <p:txBody>
+          <a:bodyPr>
+            <a:normAutofit/>
+          </a:bodyPr>
+          <a:lstStyle/>
+          <a:p>
+            <a:pPr marL="0" indent="0" algn="just">
+              <a:buNone/>
+            </a:pPr>
+            <a:r>
+              <a:rPr lang="en-US" dirty="0"/>
+              <a:t>Although various complaint management systems exist, significant gaps persist in effectively connecting constituents with their representatives. Current communication channels often lack real-time interaction features, leading to delays in complaint resolution and insufficient civic engagement. This results in delayed problem resolution, reduced accountability, and a growing disconnect between representatives and the public. Citizens face challenges in engaging with their representatives, easily filing complaints, tracking their progress, or receiving timely responses. Consequently, there is a pressing need for a unified solution that fosters better communication, transparency, and efficient governance.</a:t>
+            </a:r>
+          </a:p>
+        </p:txBody>
+      </p:sp>
+      <p:cxnSp>
+        <p:nvCxnSpPr>
+          <p:cNvPr id="10" name="Straight Connector 9">
+            <a:extLst>
+              <a:ext uri="{FF2B5EF4-FFF2-40B4-BE49-F238E27FC236}">
+                <a16:creationId xmlns:a16="http://schemas.microsoft.com/office/drawing/2014/main" id="{5C4D56EA-8905-CAFF-FA8B-91B461D57C36}"/>
+              </a:ext>
+            </a:extLst>
+          </p:cNvPr>
+          <p:cNvCxnSpPr>
+            <a:cxnSpLocks/>
+          </p:cNvCxnSpPr>
+          <p:nvPr/>
+        </p:nvCxnSpPr>
+        <p:spPr>
+          <a:xfrm>
+            <a:off x="929640" y="1237129"/>
+            <a:ext cx="10332720" cy="0"/>
+          </a:xfrm>
+          <a:prstGeom prst="line">
+            <a:avLst/>
+          </a:prstGeom>
+          <a:ln w="28575"/>
+        </p:spPr>
+        <p:style>
+          <a:lnRef idx="3">
+            <a:schemeClr val="dk1"/>
+          </a:lnRef>
+          <a:fillRef idx="0">
+            <a:schemeClr val="dk1"/>
+          </a:fillRef>
+          <a:effectRef idx="2">
+            <a:schemeClr val="dk1"/>
+          </a:effectRef>
+          <a:fontRef idx="minor">
+            <a:schemeClr val="tx1"/>
+          </a:fontRef>
+        </p:style>
+      </p:cxnSp>
+    </p:spTree>
+    <p:extLst>
+      <p:ext uri="{BB962C8B-B14F-4D97-AF65-F5344CB8AC3E}">
+        <p14:creationId xmlns:p14="http://schemas.microsoft.com/office/powerpoint/2010/main" val="3818984777"/>
+      </p:ext>
+    </p:extLst>
+  </p:cSld>
+  <p:clrMapOvr>
+    <a:masterClrMapping/>
+  </p:clrMapOvr>
+</p:sld>
+</file>
+
+<file path=ppt/slides/slide2.xml><?xml version="1.0" encoding="utf-8"?>
+<p:sld xmlns:a="http://schemas.openxmlformats.org/drawingml/2006/main" xmlns:r="http://schemas.openxmlformats.org/officeDocument/2006/relationships" xmlns:p="http://schemas.openxmlformats.org/presentationml/2006/main">
+  <p:cSld>
+    <p:spTree>
+      <p:nvGrpSpPr>
+        <p:cNvPr id="1" name=""/>
+        <p:cNvGrpSpPr/>
+        <p:nvPr/>
+      </p:nvGrpSpPr>
+      <p:grpSpPr>
+        <a:xfrm>
+          <a:off x="0" y="0"/>
+          <a:ext cx="0" cy="0"/>
+          <a:chOff x="0" y="0"/>
+          <a:chExt cx="0" cy="0"/>
+        </a:xfrm>
+      </p:grpSpPr>
+      <p:sp>
+        <p:nvSpPr>
+          <p:cNvPr id="2" name="Title 1"/>
+          <p:cNvSpPr>
+            <a:spLocks noGrp="1"/>
+          </p:cNvSpPr>
+          <p:nvPr>
+            <p:ph type="title"/>
+          </p:nvPr>
+        </p:nvSpPr>
+        <p:spPr/>
+        <p:txBody>
+          <a:bodyPr/>
+          <a:lstStyle/>
+          <a:p>
+            <a:r>
+              <a:rPr lang="en-US" b="1" dirty="0">
+                <a:solidFill>
+                  <a:srgbClr val="36ABF3"/>
+                </a:solidFill>
+              </a:rPr>
+              <a:t>Table of Contents</a:t>
+            </a:r>
+          </a:p>
+        </p:txBody>
+      </p:sp>
+      <p:sp>
+        <p:nvSpPr>
+          <p:cNvPr id="3" name="Content Placeholder 2"/>
+          <p:cNvSpPr>
+            <a:spLocks noGrp="1"/>
+          </p:cNvSpPr>
+          <p:nvPr>
+            <p:ph idx="1"/>
+          </p:nvPr>
+        </p:nvSpPr>
+        <p:spPr/>
+        <p:txBody>
+          <a:bodyPr>
+            <a:normAutofit/>
+          </a:bodyPr>
+          <a:lstStyle/>
+          <a:p>
+            <a:r>
+              <a:rPr lang="en-US" dirty="0"/>
+              <a:t>Introduction</a:t>
+            </a:r>
+          </a:p>
+          <a:p>
+            <a:r>
+              <a:rPr lang="en-US" dirty="0"/>
+              <a:t>Literature Review</a:t>
+            </a:r>
+          </a:p>
+          <a:p>
+            <a:r>
+              <a:rPr lang="en-US" dirty="0"/>
+              <a:t>Benchmarking</a:t>
+            </a:r>
+          </a:p>
+          <a:p>
+            <a:r>
+              <a:rPr lang="en-US" dirty="0"/>
+              <a:t>Problem Statement</a:t>
+            </a:r>
+          </a:p>
+          <a:p>
+            <a:r>
+              <a:rPr lang="en-US" dirty="0"/>
+              <a:t>Proposed Model/Solution</a:t>
+            </a:r>
+          </a:p>
+          <a:p>
+            <a:r>
+              <a:rPr lang="en-US" dirty="0"/>
+              <a:t>Scope</a:t>
+            </a:r>
+          </a:p>
+          <a:p>
+            <a:r>
+              <a:rPr lang="en-US" dirty="0"/>
+              <a:t>Tools and Technologies (Market Based)</a:t>
+            </a:r>
+          </a:p>
+          <a:p>
+            <a:r>
+              <a:rPr lang="en-US" dirty="0"/>
+              <a:t>Final Outcome</a:t>
+            </a:r>
+          </a:p>
+        </p:txBody>
+      </p:sp>
+    </p:spTree>
+    <p:extLst>
+      <p:ext uri="{BB962C8B-B14F-4D97-AF65-F5344CB8AC3E}">
+        <p14:creationId xmlns:p14="http://schemas.microsoft.com/office/powerpoint/2010/main" val="2345955974"/>
+      </p:ext>
+    </p:extLst>
+  </p:cSld>
+  <p:clrMapOvr>
+    <a:masterClrMapping/>
+  </p:clrMapOvr>
+</p:sld>
+</file>
+
+<file path=ppt/slides/slide20.xml><?xml version="1.0" encoding="utf-8"?>
+<p:sld xmlns:a="http://schemas.openxmlformats.org/drawingml/2006/main" xmlns:r="http://schemas.openxmlformats.org/officeDocument/2006/relationships" xmlns:p="http://schemas.openxmlformats.org/presentationml/2006/main">
+  <p:cSld>
+    <p:spTree>
+      <p:nvGrpSpPr>
+        <p:cNvPr id="1" name=""/>
+        <p:cNvGrpSpPr/>
+        <p:nvPr/>
+      </p:nvGrpSpPr>
+      <p:grpSpPr>
+        <a:xfrm>
+          <a:off x="0" y="0"/>
+          <a:ext cx="0" cy="0"/>
+          <a:chOff x="0" y="0"/>
+          <a:chExt cx="0" cy="0"/>
+        </a:xfrm>
+      </p:grpSpPr>
+      <p:sp>
+        <p:nvSpPr>
+          <p:cNvPr id="2" name="Title 1"/>
+          <p:cNvSpPr>
+            <a:spLocks noGrp="1"/>
+          </p:cNvSpPr>
+          <p:nvPr>
+            <p:ph type="title"/>
+          </p:nvPr>
+        </p:nvSpPr>
         <p:spPr/>
         <p:txBody>
           <a:bodyPr/>
@@ -6467,209 +6724,6 @@
 </p:sld>
 </file>
 
-<file path=ppt/slides/slide2.xml><?xml version="1.0" encoding="utf-8"?>
-<p:sld xmlns:a="http://schemas.openxmlformats.org/drawingml/2006/main" xmlns:r="http://schemas.openxmlformats.org/officeDocument/2006/relationships" xmlns:p="http://schemas.openxmlformats.org/presentationml/2006/main">
-  <p:cSld>
-    <p:spTree>
-      <p:nvGrpSpPr>
-        <p:cNvPr id="1" name=""/>
-        <p:cNvGrpSpPr/>
-        <p:nvPr/>
-      </p:nvGrpSpPr>
-      <p:grpSpPr>
-        <a:xfrm>
-          <a:off x="0" y="0"/>
-          <a:ext cx="0" cy="0"/>
-          <a:chOff x="0" y="0"/>
-          <a:chExt cx="0" cy="0"/>
-        </a:xfrm>
-      </p:grpSpPr>
-      <p:sp>
-        <p:nvSpPr>
-          <p:cNvPr id="2" name="Title 1"/>
-          <p:cNvSpPr>
-            <a:spLocks noGrp="1"/>
-          </p:cNvSpPr>
-          <p:nvPr>
-            <p:ph type="title"/>
-          </p:nvPr>
-        </p:nvSpPr>
-        <p:spPr/>
-        <p:txBody>
-          <a:bodyPr/>
-          <a:lstStyle/>
-          <a:p>
-            <a:r>
-              <a:rPr lang="en-US" b="1" dirty="0">
-                <a:solidFill>
-                  <a:srgbClr val="36ABF3"/>
-                </a:solidFill>
-              </a:rPr>
-              <a:t>Table of Contents</a:t>
-            </a:r>
-          </a:p>
-        </p:txBody>
-      </p:sp>
-      <p:sp>
-        <p:nvSpPr>
-          <p:cNvPr id="3" name="Content Placeholder 2"/>
-          <p:cNvSpPr>
-            <a:spLocks noGrp="1"/>
-          </p:cNvSpPr>
-          <p:nvPr>
-            <p:ph idx="1"/>
-          </p:nvPr>
-        </p:nvSpPr>
-        <p:spPr/>
-        <p:txBody>
-          <a:bodyPr>
-            <a:normAutofit/>
-          </a:bodyPr>
-          <a:lstStyle/>
-          <a:p>
-            <a:r>
-              <a:rPr lang="en-US" dirty="0"/>
-              <a:t>Introduction</a:t>
-            </a:r>
-          </a:p>
-          <a:p>
-            <a:r>
-              <a:rPr lang="en-US" dirty="0"/>
-              <a:t>Literature Review</a:t>
-            </a:r>
-          </a:p>
-          <a:p>
-            <a:r>
-              <a:rPr lang="en-US" dirty="0"/>
-              <a:t>Benchmarking</a:t>
-            </a:r>
-          </a:p>
-          <a:p>
-            <a:r>
-              <a:rPr lang="en-US" dirty="0"/>
-              <a:t>Problem Statement</a:t>
-            </a:r>
-          </a:p>
-          <a:p>
-            <a:r>
-              <a:rPr lang="en-US" dirty="0"/>
-              <a:t>Proposed Model/Solution</a:t>
-            </a:r>
-          </a:p>
-          <a:p>
-            <a:r>
-              <a:rPr lang="en-US" dirty="0"/>
-              <a:t>Scope</a:t>
-            </a:r>
-          </a:p>
-          <a:p>
-            <a:r>
-              <a:rPr lang="en-US" dirty="0"/>
-              <a:t>Tools and Technologies (Market Based)</a:t>
-            </a:r>
-          </a:p>
-          <a:p>
-            <a:r>
-              <a:rPr lang="en-US" dirty="0"/>
-              <a:t>Final Outcome</a:t>
-            </a:r>
-          </a:p>
-        </p:txBody>
-      </p:sp>
-    </p:spTree>
-    <p:extLst>
-      <p:ext uri="{BB962C8B-B14F-4D97-AF65-F5344CB8AC3E}">
-        <p14:creationId xmlns:p14="http://schemas.microsoft.com/office/powerpoint/2010/main" val="2345955974"/>
-      </p:ext>
-    </p:extLst>
-  </p:cSld>
-  <p:clrMapOvr>
-    <a:masterClrMapping/>
-  </p:clrMapOvr>
-</p:sld>
-</file>
-
-<file path=ppt/slides/slide20.xml><?xml version="1.0" encoding="utf-8"?>
-<p:sld xmlns:a="http://schemas.openxmlformats.org/drawingml/2006/main" xmlns:r="http://schemas.openxmlformats.org/officeDocument/2006/relationships" xmlns:p="http://schemas.openxmlformats.org/presentationml/2006/main">
-  <p:cSld>
-    <p:spTree>
-      <p:nvGrpSpPr>
-        <p:cNvPr id="1" name=""/>
-        <p:cNvGrpSpPr/>
-        <p:nvPr/>
-      </p:nvGrpSpPr>
-      <p:grpSpPr>
-        <a:xfrm>
-          <a:off x="0" y="0"/>
-          <a:ext cx="0" cy="0"/>
-          <a:chOff x="0" y="0"/>
-          <a:chExt cx="0" cy="0"/>
-        </a:xfrm>
-      </p:grpSpPr>
-      <p:sp>
-        <p:nvSpPr>
-          <p:cNvPr id="2" name="Title 1"/>
-          <p:cNvSpPr>
-            <a:spLocks noGrp="1"/>
-          </p:cNvSpPr>
-          <p:nvPr>
-            <p:ph type="title"/>
-          </p:nvPr>
-        </p:nvSpPr>
-        <p:spPr/>
-        <p:txBody>
-          <a:bodyPr/>
-          <a:lstStyle/>
-          <a:p>
-            <a:r>
-              <a:rPr lang="en-US" b="1" dirty="0">
-                <a:solidFill>
-                  <a:schemeClr val="accent1">
-                    <a:lumMod val="75000"/>
-                  </a:schemeClr>
-                </a:solidFill>
-              </a:rPr>
-              <a:t>Scope of your Project</a:t>
-            </a:r>
-          </a:p>
-        </p:txBody>
-      </p:sp>
-      <p:sp>
-        <p:nvSpPr>
-          <p:cNvPr id="3" name="Content Placeholder 2"/>
-          <p:cNvSpPr>
-            <a:spLocks noGrp="1"/>
-          </p:cNvSpPr>
-          <p:nvPr>
-            <p:ph idx="1"/>
-          </p:nvPr>
-        </p:nvSpPr>
-        <p:spPr/>
-        <p:txBody>
-          <a:bodyPr/>
-          <a:lstStyle/>
-          <a:p>
-            <a:pPr algn="just"/>
-            <a:r>
-              <a:rPr lang="en-US" dirty="0"/>
-              <a:t>Properly write the scope of your project. Avoid general solutions. </a:t>
-            </a:r>
-          </a:p>
-        </p:txBody>
-      </p:sp>
-    </p:spTree>
-    <p:extLst>
-      <p:ext uri="{BB962C8B-B14F-4D97-AF65-F5344CB8AC3E}">
-        <p14:creationId xmlns:p14="http://schemas.microsoft.com/office/powerpoint/2010/main" val="1236339636"/>
-      </p:ext>
-    </p:extLst>
-  </p:cSld>
-  <p:clrMapOvr>
-    <a:masterClrMapping/>
-  </p:clrMapOvr>
-</p:sld>
-</file>
-
 <file path=ppt/slides/slide21.xml><?xml version="1.0" encoding="utf-8"?>
 <p:sld xmlns:a="http://schemas.openxmlformats.org/drawingml/2006/main" xmlns:r="http://schemas.openxmlformats.org/officeDocument/2006/relationships" xmlns:p="http://schemas.openxmlformats.org/presentationml/2006/main">
   <p:cSld>
@@ -6697,87 +6751,6 @@
             <p:ph type="title"/>
           </p:nvPr>
         </p:nvSpPr>
-        <p:spPr/>
-        <p:txBody>
-          <a:bodyPr/>
-          <a:lstStyle/>
-          <a:p>
-            <a:r>
-              <a:rPr lang="en-US" b="1" dirty="0">
-                <a:solidFill>
-                  <a:schemeClr val="accent1">
-                    <a:lumMod val="75000"/>
-                  </a:schemeClr>
-                </a:solidFill>
-              </a:rPr>
-              <a:t>Tools and Technologies (Market Base)</a:t>
-            </a:r>
-          </a:p>
-        </p:txBody>
-      </p:sp>
-      <p:sp>
-        <p:nvSpPr>
-          <p:cNvPr id="3" name="Content Placeholder 2"/>
-          <p:cNvSpPr>
-            <a:spLocks noGrp="1"/>
-          </p:cNvSpPr>
-          <p:nvPr>
-            <p:ph idx="1"/>
-          </p:nvPr>
-        </p:nvSpPr>
-        <p:spPr/>
-        <p:txBody>
-          <a:bodyPr/>
-          <a:lstStyle/>
-          <a:p>
-            <a:pPr algn="just"/>
-            <a:r>
-              <a:rPr lang="en-US" dirty="0"/>
-              <a:t>List down tools and technologies, you want to use for development purposes. Avoid old ones, explore market oriented tools and technologies. </a:t>
-            </a:r>
-          </a:p>
-        </p:txBody>
-      </p:sp>
-    </p:spTree>
-    <p:extLst>
-      <p:ext uri="{BB962C8B-B14F-4D97-AF65-F5344CB8AC3E}">
-        <p14:creationId xmlns:p14="http://schemas.microsoft.com/office/powerpoint/2010/main" val="1034597514"/>
-      </p:ext>
-    </p:extLst>
-  </p:cSld>
-  <p:clrMapOvr>
-    <a:masterClrMapping/>
-  </p:clrMapOvr>
-</p:sld>
-</file>
-
-<file path=ppt/slides/slide22.xml><?xml version="1.0" encoding="utf-8"?>
-<p:sld xmlns:a="http://schemas.openxmlformats.org/drawingml/2006/main" xmlns:r="http://schemas.openxmlformats.org/officeDocument/2006/relationships" xmlns:p="http://schemas.openxmlformats.org/presentationml/2006/main">
-  <p:cSld>
-    <p:spTree>
-      <p:nvGrpSpPr>
-        <p:cNvPr id="1" name=""/>
-        <p:cNvGrpSpPr/>
-        <p:nvPr/>
-      </p:nvGrpSpPr>
-      <p:grpSpPr>
-        <a:xfrm>
-          <a:off x="0" y="0"/>
-          <a:ext cx="0" cy="0"/>
-          <a:chOff x="0" y="0"/>
-          <a:chExt cx="0" cy="0"/>
-        </a:xfrm>
-      </p:grpSpPr>
-      <p:sp>
-        <p:nvSpPr>
-          <p:cNvPr id="2" name="Title 1"/>
-          <p:cNvSpPr>
-            <a:spLocks noGrp="1"/>
-          </p:cNvSpPr>
-          <p:nvPr>
-            <p:ph type="title"/>
-          </p:nvPr>
-        </p:nvSpPr>
         <p:spPr>
           <a:xfrm>
             <a:off x="838200" y="365125"/>
@@ -6794,7 +6767,39 @@
                   <a:srgbClr val="36ABF3"/>
                 </a:solidFill>
               </a:rPr>
-              <a:t>Tools and Technologies</a:t>
+              <a:t>Proposed Solution</a:t>
+            </a:r>
+          </a:p>
+        </p:txBody>
+      </p:sp>
+      <p:sp>
+        <p:nvSpPr>
+          <p:cNvPr id="3" name="Content Placeholder 2"/>
+          <p:cNvSpPr>
+            <a:spLocks noGrp="1"/>
+          </p:cNvSpPr>
+          <p:nvPr>
+            <p:ph idx="1"/>
+          </p:nvPr>
+        </p:nvSpPr>
+        <p:spPr>
+          <a:xfrm>
+            <a:off x="929640" y="1990166"/>
+            <a:ext cx="10332720" cy="4867834"/>
+          </a:xfrm>
+        </p:spPr>
+        <p:txBody>
+          <a:bodyPr>
+            <a:normAutofit/>
+          </a:bodyPr>
+          <a:lstStyle/>
+          <a:p>
+            <a:pPr marL="0" indent="0" algn="just">
+              <a:buNone/>
+            </a:pPr>
+            <a:r>
+              <a:rPr lang="en-US" dirty="0"/>
+              <a:t>Constituency Connect aims to bridge the communication gap between constituents and their elected representatives by providing a sophisticated platform for transparent, efficient, and real-time communication. The platform enables constituents to submit complaints, track their progress, and interact directly with representatives and relevant departments. It offers multiple channels for communication, including virtual meetups, surveys, and complaint resolution tracking. By integrating features like real-time notifications, detailed performance tracking, and multi-language support, the system empowers citizens, enhances transparency, and encourage civic engagement.</a:t>
             </a:r>
           </a:p>
         </p:txBody>
@@ -6854,8 +6859,515 @@
         </p:nvSpPr>
         <p:spPr>
           <a:xfrm>
-            <a:off x="838200" y="1305381"/>
-            <a:ext cx="10515600" cy="959083"/>
+            <a:off x="929640" y="1150051"/>
+            <a:ext cx="10332720" cy="959083"/>
+          </a:xfrm>
+          <a:prstGeom prst="rect">
+            <a:avLst/>
+          </a:prstGeom>
+        </p:spPr>
+        <p:txBody>
+          <a:bodyPr vert="horz" lIns="91440" tIns="45720" rIns="91440" bIns="45720" rtlCol="0" anchor="ctr">
+            <a:normAutofit/>
+          </a:bodyPr>
+          <a:lstStyle>
+            <a:lvl1pPr algn="l" defTabSz="914400" rtl="0" eaLnBrk="1" latinLnBrk="0" hangingPunct="1">
+              <a:lnSpc>
+                <a:spcPct val="90000"/>
+              </a:lnSpc>
+              <a:spcBef>
+                <a:spcPct val="0"/>
+              </a:spcBef>
+              <a:buNone/>
+              <a:defRPr sz="4400" kern="1200">
+                <a:solidFill>
+                  <a:schemeClr val="tx1"/>
+                </a:solidFill>
+                <a:latin typeface="+mj-lt"/>
+                <a:ea typeface="+mj-ea"/>
+                <a:cs typeface="+mj-cs"/>
+              </a:defRPr>
+            </a:lvl1pPr>
+          </a:lstStyle>
+          <a:p>
+            <a:r>
+              <a:rPr lang="en-US" sz="3600" b="1" dirty="0">
+                <a:solidFill>
+                  <a:srgbClr val="F8981C"/>
+                </a:solidFill>
+              </a:rPr>
+              <a:t>Problem Solution </a:t>
+            </a:r>
+          </a:p>
+        </p:txBody>
+      </p:sp>
+    </p:spTree>
+    <p:extLst>
+      <p:ext uri="{BB962C8B-B14F-4D97-AF65-F5344CB8AC3E}">
+        <p14:creationId xmlns:p14="http://schemas.microsoft.com/office/powerpoint/2010/main" val="166178789"/>
+      </p:ext>
+    </p:extLst>
+  </p:cSld>
+  <p:clrMapOvr>
+    <a:masterClrMapping/>
+  </p:clrMapOvr>
+</p:sld>
+</file>
+
+<file path=ppt/slides/slide22.xml><?xml version="1.0" encoding="utf-8"?>
+<p:sld xmlns:a="http://schemas.openxmlformats.org/drawingml/2006/main" xmlns:r="http://schemas.openxmlformats.org/officeDocument/2006/relationships" xmlns:p="http://schemas.openxmlformats.org/presentationml/2006/main">
+  <p:cSld>
+    <p:spTree>
+      <p:nvGrpSpPr>
+        <p:cNvPr id="1" name=""/>
+        <p:cNvGrpSpPr/>
+        <p:nvPr/>
+      </p:nvGrpSpPr>
+      <p:grpSpPr>
+        <a:xfrm>
+          <a:off x="0" y="0"/>
+          <a:ext cx="0" cy="0"/>
+          <a:chOff x="0" y="0"/>
+          <a:chExt cx="0" cy="0"/>
+        </a:xfrm>
+      </p:grpSpPr>
+      <p:sp>
+        <p:nvSpPr>
+          <p:cNvPr id="2" name="Title 1"/>
+          <p:cNvSpPr>
+            <a:spLocks noGrp="1"/>
+          </p:cNvSpPr>
+          <p:nvPr>
+            <p:ph type="title"/>
+          </p:nvPr>
+        </p:nvSpPr>
+        <p:spPr>
+          <a:xfrm>
+            <a:off x="838200" y="365125"/>
+            <a:ext cx="10515600" cy="980959"/>
+          </a:xfrm>
+        </p:spPr>
+        <p:txBody>
+          <a:bodyPr/>
+          <a:lstStyle/>
+          <a:p>
+            <a:r>
+              <a:rPr lang="en-US" b="1" dirty="0">
+                <a:solidFill>
+                  <a:srgbClr val="36ABF3"/>
+                </a:solidFill>
+              </a:rPr>
+              <a:t>Proposed Solution</a:t>
+            </a:r>
+          </a:p>
+        </p:txBody>
+      </p:sp>
+      <p:sp>
+        <p:nvSpPr>
+          <p:cNvPr id="3" name="Content Placeholder 2"/>
+          <p:cNvSpPr>
+            <a:spLocks noGrp="1"/>
+          </p:cNvSpPr>
+          <p:nvPr>
+            <p:ph idx="1"/>
+          </p:nvPr>
+        </p:nvSpPr>
+        <p:spPr>
+          <a:xfrm>
+            <a:off x="929640" y="1990166"/>
+            <a:ext cx="10332720" cy="4867834"/>
+          </a:xfrm>
+        </p:spPr>
+        <p:txBody>
+          <a:bodyPr>
+            <a:normAutofit/>
+          </a:bodyPr>
+          <a:lstStyle/>
+          <a:p>
+            <a:pPr marL="0" indent="0" algn="just">
+              <a:buNone/>
+            </a:pPr>
+            <a:endParaRPr lang="en-US" dirty="0"/>
+          </a:p>
+        </p:txBody>
+      </p:sp>
+      <p:cxnSp>
+        <p:nvCxnSpPr>
+          <p:cNvPr id="10" name="Straight Connector 9">
+            <a:extLst>
+              <a:ext uri="{FF2B5EF4-FFF2-40B4-BE49-F238E27FC236}">
+                <a16:creationId xmlns:a16="http://schemas.microsoft.com/office/drawing/2014/main" id="{5C4D56EA-8905-CAFF-FA8B-91B461D57C36}"/>
+              </a:ext>
+            </a:extLst>
+          </p:cNvPr>
+          <p:cNvCxnSpPr>
+            <a:cxnSpLocks/>
+          </p:cNvCxnSpPr>
+          <p:nvPr/>
+        </p:nvCxnSpPr>
+        <p:spPr>
+          <a:xfrm>
+            <a:off x="929640" y="1237129"/>
+            <a:ext cx="10332720" cy="0"/>
+          </a:xfrm>
+          <a:prstGeom prst="line">
+            <a:avLst/>
+          </a:prstGeom>
+          <a:ln w="28575"/>
+        </p:spPr>
+        <p:style>
+          <a:lnRef idx="3">
+            <a:schemeClr val="dk1"/>
+          </a:lnRef>
+          <a:fillRef idx="0">
+            <a:schemeClr val="dk1"/>
+          </a:fillRef>
+          <a:effectRef idx="2">
+            <a:schemeClr val="dk1"/>
+          </a:effectRef>
+          <a:fontRef idx="minor">
+            <a:schemeClr val="tx1"/>
+          </a:fontRef>
+        </p:style>
+      </p:cxnSp>
+      <p:sp>
+        <p:nvSpPr>
+          <p:cNvPr id="4" name="Title 1">
+            <a:extLst>
+              <a:ext uri="{FF2B5EF4-FFF2-40B4-BE49-F238E27FC236}">
+                <a16:creationId xmlns:a16="http://schemas.microsoft.com/office/drawing/2014/main" id="{7ED9CE21-68A5-DE6F-C9B3-F22A1957B184}"/>
+              </a:ext>
+            </a:extLst>
+          </p:cNvPr>
+          <p:cNvSpPr txBox="1">
+            <a:spLocks/>
+          </p:cNvSpPr>
+          <p:nvPr/>
+        </p:nvSpPr>
+        <p:spPr>
+          <a:xfrm>
+            <a:off x="929640" y="1150051"/>
+            <a:ext cx="10332720" cy="959083"/>
+          </a:xfrm>
+          <a:prstGeom prst="rect">
+            <a:avLst/>
+          </a:prstGeom>
+        </p:spPr>
+        <p:txBody>
+          <a:bodyPr vert="horz" lIns="91440" tIns="45720" rIns="91440" bIns="45720" rtlCol="0" anchor="ctr">
+            <a:normAutofit/>
+          </a:bodyPr>
+          <a:lstStyle>
+            <a:lvl1pPr algn="l" defTabSz="914400" rtl="0" eaLnBrk="1" latinLnBrk="0" hangingPunct="1">
+              <a:lnSpc>
+                <a:spcPct val="90000"/>
+              </a:lnSpc>
+              <a:spcBef>
+                <a:spcPct val="0"/>
+              </a:spcBef>
+              <a:buNone/>
+              <a:defRPr sz="4400" kern="1200">
+                <a:solidFill>
+                  <a:schemeClr val="tx1"/>
+                </a:solidFill>
+                <a:latin typeface="+mj-lt"/>
+                <a:ea typeface="+mj-ea"/>
+                <a:cs typeface="+mj-cs"/>
+              </a:defRPr>
+            </a:lvl1pPr>
+          </a:lstStyle>
+          <a:p>
+            <a:r>
+              <a:rPr lang="en-US" sz="3600" b="1" dirty="0">
+                <a:solidFill>
+                  <a:srgbClr val="F8981C"/>
+                </a:solidFill>
+              </a:rPr>
+              <a:t>Model Diagram</a:t>
+            </a:r>
+          </a:p>
+        </p:txBody>
+      </p:sp>
+    </p:spTree>
+    <p:extLst>
+      <p:ext uri="{BB962C8B-B14F-4D97-AF65-F5344CB8AC3E}">
+        <p14:creationId xmlns:p14="http://schemas.microsoft.com/office/powerpoint/2010/main" val="3619705979"/>
+      </p:ext>
+    </p:extLst>
+  </p:cSld>
+  <p:clrMapOvr>
+    <a:masterClrMapping/>
+  </p:clrMapOvr>
+</p:sld>
+</file>
+
+<file path=ppt/slides/slide23.xml><?xml version="1.0" encoding="utf-8"?>
+<p:sld xmlns:a="http://schemas.openxmlformats.org/drawingml/2006/main" xmlns:r="http://schemas.openxmlformats.org/officeDocument/2006/relationships" xmlns:p="http://schemas.openxmlformats.org/presentationml/2006/main">
+  <p:cSld>
+    <p:spTree>
+      <p:nvGrpSpPr>
+        <p:cNvPr id="1" name=""/>
+        <p:cNvGrpSpPr/>
+        <p:nvPr/>
+      </p:nvGrpSpPr>
+      <p:grpSpPr>
+        <a:xfrm>
+          <a:off x="0" y="0"/>
+          <a:ext cx="0" cy="0"/>
+          <a:chOff x="0" y="0"/>
+          <a:chExt cx="0" cy="0"/>
+        </a:xfrm>
+      </p:grpSpPr>
+      <p:sp>
+        <p:nvSpPr>
+          <p:cNvPr id="2" name="Title 1"/>
+          <p:cNvSpPr>
+            <a:spLocks noGrp="1"/>
+          </p:cNvSpPr>
+          <p:nvPr>
+            <p:ph type="title"/>
+          </p:nvPr>
+        </p:nvSpPr>
+        <p:spPr/>
+        <p:txBody>
+          <a:bodyPr/>
+          <a:lstStyle/>
+          <a:p>
+            <a:r>
+              <a:rPr lang="en-US" b="1" dirty="0">
+                <a:solidFill>
+                  <a:schemeClr val="accent1">
+                    <a:lumMod val="75000"/>
+                  </a:schemeClr>
+                </a:solidFill>
+              </a:rPr>
+              <a:t>Scope of your Project</a:t>
+            </a:r>
+          </a:p>
+        </p:txBody>
+      </p:sp>
+      <p:sp>
+        <p:nvSpPr>
+          <p:cNvPr id="3" name="Content Placeholder 2"/>
+          <p:cNvSpPr>
+            <a:spLocks noGrp="1"/>
+          </p:cNvSpPr>
+          <p:nvPr>
+            <p:ph idx="1"/>
+          </p:nvPr>
+        </p:nvSpPr>
+        <p:spPr/>
+        <p:txBody>
+          <a:bodyPr/>
+          <a:lstStyle/>
+          <a:p>
+            <a:pPr algn="just"/>
+            <a:r>
+              <a:rPr lang="en-US" dirty="0"/>
+              <a:t>Properly write the scope of your project. Avoid general solutions. </a:t>
+            </a:r>
+          </a:p>
+        </p:txBody>
+      </p:sp>
+    </p:spTree>
+    <p:extLst>
+      <p:ext uri="{BB962C8B-B14F-4D97-AF65-F5344CB8AC3E}">
+        <p14:creationId xmlns:p14="http://schemas.microsoft.com/office/powerpoint/2010/main" val="1236339636"/>
+      </p:ext>
+    </p:extLst>
+  </p:cSld>
+  <p:clrMapOvr>
+    <a:masterClrMapping/>
+  </p:clrMapOvr>
+</p:sld>
+</file>
+
+<file path=ppt/slides/slide24.xml><?xml version="1.0" encoding="utf-8"?>
+<p:sld xmlns:a="http://schemas.openxmlformats.org/drawingml/2006/main" xmlns:r="http://schemas.openxmlformats.org/officeDocument/2006/relationships" xmlns:p="http://schemas.openxmlformats.org/presentationml/2006/main">
+  <p:cSld>
+    <p:spTree>
+      <p:nvGrpSpPr>
+        <p:cNvPr id="1" name=""/>
+        <p:cNvGrpSpPr/>
+        <p:nvPr/>
+      </p:nvGrpSpPr>
+      <p:grpSpPr>
+        <a:xfrm>
+          <a:off x="0" y="0"/>
+          <a:ext cx="0" cy="0"/>
+          <a:chOff x="0" y="0"/>
+          <a:chExt cx="0" cy="0"/>
+        </a:xfrm>
+      </p:grpSpPr>
+      <p:sp>
+        <p:nvSpPr>
+          <p:cNvPr id="2" name="Title 1"/>
+          <p:cNvSpPr>
+            <a:spLocks noGrp="1"/>
+          </p:cNvSpPr>
+          <p:nvPr>
+            <p:ph type="title"/>
+          </p:nvPr>
+        </p:nvSpPr>
+        <p:spPr/>
+        <p:txBody>
+          <a:bodyPr/>
+          <a:lstStyle/>
+          <a:p>
+            <a:r>
+              <a:rPr lang="en-US" b="1" dirty="0">
+                <a:solidFill>
+                  <a:schemeClr val="accent1">
+                    <a:lumMod val="75000"/>
+                  </a:schemeClr>
+                </a:solidFill>
+              </a:rPr>
+              <a:t>Tools and Technologies (Market Base)</a:t>
+            </a:r>
+          </a:p>
+        </p:txBody>
+      </p:sp>
+      <p:sp>
+        <p:nvSpPr>
+          <p:cNvPr id="3" name="Content Placeholder 2"/>
+          <p:cNvSpPr>
+            <a:spLocks noGrp="1"/>
+          </p:cNvSpPr>
+          <p:nvPr>
+            <p:ph idx="1"/>
+          </p:nvPr>
+        </p:nvSpPr>
+        <p:spPr/>
+        <p:txBody>
+          <a:bodyPr/>
+          <a:lstStyle/>
+          <a:p>
+            <a:pPr algn="just"/>
+            <a:r>
+              <a:rPr lang="en-US" dirty="0"/>
+              <a:t>List down tools and technologies, you want to use for development purposes. Avoid old ones, explore market oriented tools and technologies. </a:t>
+            </a:r>
+          </a:p>
+        </p:txBody>
+      </p:sp>
+    </p:spTree>
+    <p:extLst>
+      <p:ext uri="{BB962C8B-B14F-4D97-AF65-F5344CB8AC3E}">
+        <p14:creationId xmlns:p14="http://schemas.microsoft.com/office/powerpoint/2010/main" val="1034597514"/>
+      </p:ext>
+    </p:extLst>
+  </p:cSld>
+  <p:clrMapOvr>
+    <a:masterClrMapping/>
+  </p:clrMapOvr>
+</p:sld>
+</file>
+
+<file path=ppt/slides/slide25.xml><?xml version="1.0" encoding="utf-8"?>
+<p:sld xmlns:a="http://schemas.openxmlformats.org/drawingml/2006/main" xmlns:r="http://schemas.openxmlformats.org/officeDocument/2006/relationships" xmlns:p="http://schemas.openxmlformats.org/presentationml/2006/main">
+  <p:cSld>
+    <p:spTree>
+      <p:nvGrpSpPr>
+        <p:cNvPr id="1" name=""/>
+        <p:cNvGrpSpPr/>
+        <p:nvPr/>
+      </p:nvGrpSpPr>
+      <p:grpSpPr>
+        <a:xfrm>
+          <a:off x="0" y="0"/>
+          <a:ext cx="0" cy="0"/>
+          <a:chOff x="0" y="0"/>
+          <a:chExt cx="0" cy="0"/>
+        </a:xfrm>
+      </p:grpSpPr>
+      <p:sp>
+        <p:nvSpPr>
+          <p:cNvPr id="2" name="Title 1"/>
+          <p:cNvSpPr>
+            <a:spLocks noGrp="1"/>
+          </p:cNvSpPr>
+          <p:nvPr>
+            <p:ph type="title"/>
+          </p:nvPr>
+        </p:nvSpPr>
+        <p:spPr>
+          <a:xfrm>
+            <a:off x="838200" y="365125"/>
+            <a:ext cx="10515600" cy="980959"/>
+          </a:xfrm>
+        </p:spPr>
+        <p:txBody>
+          <a:bodyPr/>
+          <a:lstStyle/>
+          <a:p>
+            <a:r>
+              <a:rPr lang="en-US" b="1" dirty="0">
+                <a:solidFill>
+                  <a:srgbClr val="36ABF3"/>
+                </a:solidFill>
+              </a:rPr>
+              <a:t>Tools and Technologies</a:t>
+            </a:r>
+          </a:p>
+        </p:txBody>
+      </p:sp>
+      <p:cxnSp>
+        <p:nvCxnSpPr>
+          <p:cNvPr id="10" name="Straight Connector 9">
+            <a:extLst>
+              <a:ext uri="{FF2B5EF4-FFF2-40B4-BE49-F238E27FC236}">
+                <a16:creationId xmlns:a16="http://schemas.microsoft.com/office/drawing/2014/main" id="{5C4D56EA-8905-CAFF-FA8B-91B461D57C36}"/>
+              </a:ext>
+            </a:extLst>
+          </p:cNvPr>
+          <p:cNvCxnSpPr>
+            <a:cxnSpLocks/>
+          </p:cNvCxnSpPr>
+          <p:nvPr/>
+        </p:nvCxnSpPr>
+        <p:spPr>
+          <a:xfrm>
+            <a:off x="929640" y="1237129"/>
+            <a:ext cx="10332720" cy="0"/>
+          </a:xfrm>
+          <a:prstGeom prst="line">
+            <a:avLst/>
+          </a:prstGeom>
+          <a:ln w="28575"/>
+        </p:spPr>
+        <p:style>
+          <a:lnRef idx="3">
+            <a:schemeClr val="dk1"/>
+          </a:lnRef>
+          <a:fillRef idx="0">
+            <a:schemeClr val="dk1"/>
+          </a:fillRef>
+          <a:effectRef idx="2">
+            <a:schemeClr val="dk1"/>
+          </a:effectRef>
+          <a:fontRef idx="minor">
+            <a:schemeClr val="tx1"/>
+          </a:fontRef>
+        </p:style>
+      </p:cxnSp>
+      <p:sp>
+        <p:nvSpPr>
+          <p:cNvPr id="4" name="Title 1">
+            <a:extLst>
+              <a:ext uri="{FF2B5EF4-FFF2-40B4-BE49-F238E27FC236}">
+                <a16:creationId xmlns:a16="http://schemas.microsoft.com/office/drawing/2014/main" id="{7ED9CE21-68A5-DE6F-C9B3-F22A1957B184}"/>
+              </a:ext>
+            </a:extLst>
+          </p:cNvPr>
+          <p:cNvSpPr txBox="1">
+            <a:spLocks/>
+          </p:cNvSpPr>
+          <p:nvPr/>
+        </p:nvSpPr>
+        <p:spPr>
+          <a:xfrm>
+            <a:off x="929640" y="1305381"/>
+            <a:ext cx="10332720" cy="959083"/>
           </a:xfrm>
           <a:prstGeom prst="rect">
             <a:avLst/>
@@ -7258,7 +7770,7 @@
 </p:sld>
 </file>
 
-<file path=ppt/slides/slide23.xml><?xml version="1.0" encoding="utf-8"?>
+<file path=ppt/slides/slide26.xml><?xml version="1.0" encoding="utf-8"?>
 <p:sld xmlns:a="http://schemas.openxmlformats.org/drawingml/2006/main" xmlns:r="http://schemas.openxmlformats.org/officeDocument/2006/relationships" xmlns:p="http://schemas.openxmlformats.org/presentationml/2006/main">
   <p:cSld>
     <p:spTree>
@@ -7361,8 +7873,8 @@
         </p:nvSpPr>
         <p:spPr>
           <a:xfrm>
-            <a:off x="838200" y="1305381"/>
-            <a:ext cx="10515600" cy="959083"/>
+            <a:off x="929640" y="1305381"/>
+            <a:ext cx="10332720" cy="959083"/>
           </a:xfrm>
           <a:prstGeom prst="rect">
             <a:avLst/>
@@ -7419,7 +7931,7 @@
             <p:ph idx="1"/>
             <p:extLst>
               <p:ext uri="{D42A27DB-BD31-4B8C-83A1-F6EECF244321}">
-                <p14:modId xmlns:p14="http://schemas.microsoft.com/office/powerpoint/2010/main" val="992260995"/>
+                <p14:modId xmlns:p14="http://schemas.microsoft.com/office/powerpoint/2010/main" val="3878925464"/>
               </p:ext>
             </p:extLst>
           </p:nvPr>
@@ -7676,8 +8188,8 @@
         </p:nvSpPr>
         <p:spPr>
           <a:xfrm>
-            <a:off x="929640" y="4565627"/>
-            <a:ext cx="10515600" cy="959083"/>
+            <a:off x="929640" y="4539985"/>
+            <a:ext cx="10332720" cy="959083"/>
           </a:xfrm>
           <a:prstGeom prst="rect">
             <a:avLst/>
@@ -7733,14 +8245,14 @@
           <p:nvPr>
             <p:extLst>
               <p:ext uri="{D42A27DB-BD31-4B8C-83A1-F6EECF244321}">
-                <p14:modId xmlns:p14="http://schemas.microsoft.com/office/powerpoint/2010/main" val="314722539"/>
+                <p14:modId xmlns:p14="http://schemas.microsoft.com/office/powerpoint/2010/main" val="3521456279"/>
               </p:ext>
             </p:extLst>
           </p:nvPr>
         </p:nvGraphicFramePr>
         <p:xfrm>
-          <a:off x="1021080" y="5499068"/>
-          <a:ext cx="10241280" cy="518160"/>
+          <a:off x="929640" y="5499068"/>
+          <a:ext cx="10332720" cy="518160"/>
         </p:xfrm>
         <a:graphic>
           <a:graphicData uri="http://schemas.openxmlformats.org/drawingml/2006/table">
@@ -7749,14 +8261,14 @@
                 <a:tableStyleId>{2D5ABB26-0587-4C30-8999-92F81FD0307C}</a:tableStyleId>
               </a:tblPr>
               <a:tblGrid>
-                <a:gridCol w="5120640">
+                <a:gridCol w="5166360">
                   <a:extLst>
                     <a:ext uri="{9D8B030D-6E8A-4147-A177-3AD203B41FA5}">
                       <a16:colId xmlns:a16="http://schemas.microsoft.com/office/drawing/2014/main" val="2451291361"/>
                     </a:ext>
                   </a:extLst>
                 </a:gridCol>
-                <a:gridCol w="5120640">
+                <a:gridCol w="5166360">
                   <a:extLst>
                     <a:ext uri="{9D8B030D-6E8A-4147-A177-3AD203B41FA5}">
                       <a16:colId xmlns:a16="http://schemas.microsoft.com/office/drawing/2014/main" val="71425336"/>
@@ -7822,7 +8334,7 @@
 </p:sld>
 </file>
 
-<file path=ppt/slides/slide24.xml><?xml version="1.0" encoding="utf-8"?>
+<file path=ppt/slides/slide27.xml><?xml version="1.0" encoding="utf-8"?>
 <p:sld xmlns:a="http://schemas.openxmlformats.org/drawingml/2006/main" xmlns:r="http://schemas.openxmlformats.org/officeDocument/2006/relationships" xmlns:p="http://schemas.openxmlformats.org/presentationml/2006/main">
   <p:cSld>
     <p:spTree>
@@ -7925,8 +8437,8 @@
         </p:nvSpPr>
         <p:spPr>
           <a:xfrm>
-            <a:off x="838200" y="1305381"/>
-            <a:ext cx="10515600" cy="959083"/>
+            <a:off x="929640" y="1305381"/>
+            <a:ext cx="10332720" cy="959083"/>
           </a:xfrm>
           <a:prstGeom prst="rect">
             <a:avLst/>
@@ -7983,14 +8495,14 @@
             <p:ph idx="1"/>
             <p:extLst>
               <p:ext uri="{D42A27DB-BD31-4B8C-83A1-F6EECF244321}">
-                <p14:modId xmlns:p14="http://schemas.microsoft.com/office/powerpoint/2010/main" val="1037160345"/>
+                <p14:modId xmlns:p14="http://schemas.microsoft.com/office/powerpoint/2010/main" val="980804648"/>
               </p:ext>
             </p:extLst>
           </p:nvPr>
         </p:nvGraphicFramePr>
         <p:xfrm>
-          <a:off x="838200" y="2036843"/>
-          <a:ext cx="10515600" cy="518160"/>
+          <a:off x="929640" y="2036843"/>
+          <a:ext cx="10332720" cy="518160"/>
         </p:xfrm>
         <a:graphic>
           <a:graphicData uri="http://schemas.openxmlformats.org/drawingml/2006/table">
@@ -7999,14 +8511,14 @@
                 <a:tableStyleId>{2D5ABB26-0587-4C30-8999-92F81FD0307C}</a:tableStyleId>
               </a:tblPr>
               <a:tblGrid>
-                <a:gridCol w="5257800">
+                <a:gridCol w="5166360">
                   <a:extLst>
                     <a:ext uri="{9D8B030D-6E8A-4147-A177-3AD203B41FA5}">
                       <a16:colId xmlns:a16="http://schemas.microsoft.com/office/drawing/2014/main" val="1331891827"/>
                     </a:ext>
                   </a:extLst>
                 </a:gridCol>
-                <a:gridCol w="5257800">
+                <a:gridCol w="5166360">
                   <a:extLst>
                     <a:ext uri="{9D8B030D-6E8A-4147-A177-3AD203B41FA5}">
                       <a16:colId xmlns:a16="http://schemas.microsoft.com/office/drawing/2014/main" val="3628667460"/>
@@ -8075,8 +8587,8 @@
         </p:nvSpPr>
         <p:spPr>
           <a:xfrm>
-            <a:off x="838200" y="3697989"/>
-            <a:ext cx="10515600" cy="959083"/>
+            <a:off x="929640" y="3697989"/>
+            <a:ext cx="10332720" cy="959083"/>
           </a:xfrm>
           <a:prstGeom prst="rect">
             <a:avLst/>
@@ -8218,7 +8730,7 @@
 </p:sld>
 </file>
 
-<file path=ppt/slides/slide25.xml><?xml version="1.0" encoding="utf-8"?>
+<file path=ppt/slides/slide28.xml><?xml version="1.0" encoding="utf-8"?>
 <p:sld xmlns:a="http://schemas.openxmlformats.org/drawingml/2006/main" xmlns:r="http://schemas.openxmlformats.org/officeDocument/2006/relationships" xmlns:p="http://schemas.openxmlformats.org/presentationml/2006/main">
   <p:cSld>
     <p:spTree>
@@ -8306,7 +8818,7 @@
 </p:sld>
 </file>
 
-<file path=ppt/slides/slide26.xml><?xml version="1.0" encoding="utf-8"?>
+<file path=ppt/slides/slide29.xml><?xml version="1.0" encoding="utf-8"?>
 <p:sld xmlns:a="http://schemas.openxmlformats.org/drawingml/2006/main" xmlns:r="http://schemas.openxmlformats.org/officeDocument/2006/relationships" xmlns:p="http://schemas.openxmlformats.org/presentationml/2006/main">
   <p:cSld>
     <p:spTree>
@@ -8428,7 +8940,102 @@
 </p:sld>
 </file>
 
-<file path=ppt/slides/slide27.xml><?xml version="1.0" encoding="utf-8"?>
+<file path=ppt/slides/slide3.xml><?xml version="1.0" encoding="utf-8"?>
+<p:sld xmlns:a="http://schemas.openxmlformats.org/drawingml/2006/main" xmlns:r="http://schemas.openxmlformats.org/officeDocument/2006/relationships" xmlns:p="http://schemas.openxmlformats.org/presentationml/2006/main">
+  <p:cSld>
+    <p:spTree>
+      <p:nvGrpSpPr>
+        <p:cNvPr id="1" name=""/>
+        <p:cNvGrpSpPr/>
+        <p:nvPr/>
+      </p:nvGrpSpPr>
+      <p:grpSpPr>
+        <a:xfrm>
+          <a:off x="0" y="0"/>
+          <a:ext cx="0" cy="0"/>
+          <a:chOff x="0" y="0"/>
+          <a:chExt cx="0" cy="0"/>
+        </a:xfrm>
+      </p:grpSpPr>
+      <p:sp>
+        <p:nvSpPr>
+          <p:cNvPr id="2" name="Title 1"/>
+          <p:cNvSpPr>
+            <a:spLocks noGrp="1"/>
+          </p:cNvSpPr>
+          <p:nvPr>
+            <p:ph type="title"/>
+          </p:nvPr>
+        </p:nvSpPr>
+        <p:spPr/>
+        <p:txBody>
+          <a:bodyPr/>
+          <a:lstStyle/>
+          <a:p>
+            <a:r>
+              <a:rPr lang="en-US" b="1" dirty="0">
+                <a:solidFill>
+                  <a:schemeClr val="accent1">
+                    <a:lumMod val="75000"/>
+                  </a:schemeClr>
+                </a:solidFill>
+              </a:rPr>
+              <a:t>Introduction</a:t>
+            </a:r>
+          </a:p>
+        </p:txBody>
+      </p:sp>
+      <p:sp>
+        <p:nvSpPr>
+          <p:cNvPr id="3" name="Content Placeholder 2"/>
+          <p:cNvSpPr>
+            <a:spLocks noGrp="1"/>
+          </p:cNvSpPr>
+          <p:nvPr>
+            <p:ph idx="1"/>
+          </p:nvPr>
+        </p:nvSpPr>
+        <p:spPr/>
+        <p:txBody>
+          <a:bodyPr/>
+          <a:lstStyle/>
+          <a:p>
+            <a:pPr algn="just"/>
+            <a:r>
+              <a:rPr lang="en-US" dirty="0"/>
+              <a:t>Prepare at-least two (2) slides to briefly describe your project idea.</a:t>
+            </a:r>
+          </a:p>
+          <a:p>
+            <a:pPr algn="just"/>
+            <a:r>
+              <a:rPr lang="en-US" dirty="0"/>
+              <a:t>Properly reference [1] previously used tools and technologies.</a:t>
+            </a:r>
+          </a:p>
+          <a:p>
+            <a:pPr algn="just"/>
+            <a:r>
+              <a:rPr lang="en-US" dirty="0"/>
+              <a:t>If your FYP is related to research oriented properly add references of the paper [2]. </a:t>
+            </a:r>
+          </a:p>
+        </p:txBody>
+      </p:sp>
+    </p:spTree>
+    <p:extLst>
+      <p:ext uri="{BB962C8B-B14F-4D97-AF65-F5344CB8AC3E}">
+        <p14:creationId xmlns:p14="http://schemas.microsoft.com/office/powerpoint/2010/main" val="1281242701"/>
+      </p:ext>
+    </p:extLst>
+  </p:cSld>
+  <p:clrMapOvr>
+    <a:masterClrMapping/>
+  </p:clrMapOvr>
+</p:sld>
+</file>
+
+<file path=ppt/slides/slide30.xml><?xml version="1.0" encoding="utf-8"?>
 <p:sld xmlns:a="http://schemas.openxmlformats.org/drawingml/2006/main" xmlns:r="http://schemas.openxmlformats.org/officeDocument/2006/relationships" xmlns:p="http://schemas.openxmlformats.org/presentationml/2006/main">
   <p:cSld>
     <p:spTree>
@@ -8482,101 +9089,6 @@
 </p:sld>
 </file>
 
-<file path=ppt/slides/slide3.xml><?xml version="1.0" encoding="utf-8"?>
-<p:sld xmlns:a="http://schemas.openxmlformats.org/drawingml/2006/main" xmlns:r="http://schemas.openxmlformats.org/officeDocument/2006/relationships" xmlns:p="http://schemas.openxmlformats.org/presentationml/2006/main">
-  <p:cSld>
-    <p:spTree>
-      <p:nvGrpSpPr>
-        <p:cNvPr id="1" name=""/>
-        <p:cNvGrpSpPr/>
-        <p:nvPr/>
-      </p:nvGrpSpPr>
-      <p:grpSpPr>
-        <a:xfrm>
-          <a:off x="0" y="0"/>
-          <a:ext cx="0" cy="0"/>
-          <a:chOff x="0" y="0"/>
-          <a:chExt cx="0" cy="0"/>
-        </a:xfrm>
-      </p:grpSpPr>
-      <p:sp>
-        <p:nvSpPr>
-          <p:cNvPr id="2" name="Title 1"/>
-          <p:cNvSpPr>
-            <a:spLocks noGrp="1"/>
-          </p:cNvSpPr>
-          <p:nvPr>
-            <p:ph type="title"/>
-          </p:nvPr>
-        </p:nvSpPr>
-        <p:spPr/>
-        <p:txBody>
-          <a:bodyPr/>
-          <a:lstStyle/>
-          <a:p>
-            <a:r>
-              <a:rPr lang="en-US" b="1" dirty="0">
-                <a:solidFill>
-                  <a:schemeClr val="accent1">
-                    <a:lumMod val="75000"/>
-                  </a:schemeClr>
-                </a:solidFill>
-              </a:rPr>
-              <a:t>Introduction</a:t>
-            </a:r>
-          </a:p>
-        </p:txBody>
-      </p:sp>
-      <p:sp>
-        <p:nvSpPr>
-          <p:cNvPr id="3" name="Content Placeholder 2"/>
-          <p:cNvSpPr>
-            <a:spLocks noGrp="1"/>
-          </p:cNvSpPr>
-          <p:nvPr>
-            <p:ph idx="1"/>
-          </p:nvPr>
-        </p:nvSpPr>
-        <p:spPr/>
-        <p:txBody>
-          <a:bodyPr/>
-          <a:lstStyle/>
-          <a:p>
-            <a:pPr algn="just"/>
-            <a:r>
-              <a:rPr lang="en-US" dirty="0"/>
-              <a:t>Prepare at-least two (2) slides to briefly describe your project idea.</a:t>
-            </a:r>
-          </a:p>
-          <a:p>
-            <a:pPr algn="just"/>
-            <a:r>
-              <a:rPr lang="en-US" dirty="0"/>
-              <a:t>Properly reference [1] previously used tools and technologies.</a:t>
-            </a:r>
-          </a:p>
-          <a:p>
-            <a:pPr algn="just"/>
-            <a:r>
-              <a:rPr lang="en-US" dirty="0"/>
-              <a:t>If your FYP is related to research oriented properly add references of the paper [2]. </a:t>
-            </a:r>
-          </a:p>
-        </p:txBody>
-      </p:sp>
-    </p:spTree>
-    <p:extLst>
-      <p:ext uri="{BB962C8B-B14F-4D97-AF65-F5344CB8AC3E}">
-        <p14:creationId xmlns:p14="http://schemas.microsoft.com/office/powerpoint/2010/main" val="1281242701"/>
-      </p:ext>
-    </p:extLst>
-  </p:cSld>
-  <p:clrMapOvr>
-    <a:masterClrMapping/>
-  </p:clrMapOvr>
-</p:sld>
-</file>
-
 <file path=ppt/slides/slide4.xml><?xml version="1.0" encoding="utf-8"?>
 <p:sld xmlns:a="http://schemas.openxmlformats.org/drawingml/2006/main" xmlns:r="http://schemas.openxmlformats.org/officeDocument/2006/relationships" xmlns:p="http://schemas.openxmlformats.org/presentationml/2006/main">
   <p:cSld>
@@ -8637,8 +9149,8 @@
         </p:nvSpPr>
         <p:spPr>
           <a:xfrm>
-            <a:off x="838200" y="1346085"/>
-            <a:ext cx="10515600" cy="2970422"/>
+            <a:off x="929640" y="1346085"/>
+            <a:ext cx="10332720" cy="2970422"/>
           </a:xfrm>
         </p:spPr>
         <p:txBody>
@@ -8686,8 +9198,8 @@
         </p:nvSpPr>
         <p:spPr>
           <a:xfrm>
-            <a:off x="838198" y="4631483"/>
-            <a:ext cx="10515601" cy="1325564"/>
+            <a:off x="929639" y="4631483"/>
+            <a:ext cx="10332720" cy="1325564"/>
           </a:xfrm>
           <a:prstGeom prst="rect">
             <a:avLst/>
@@ -9056,8 +9568,8 @@
         </p:nvSpPr>
         <p:spPr>
           <a:xfrm>
-            <a:off x="838200" y="1990166"/>
-            <a:ext cx="10515600" cy="4867834"/>
+            <a:off x="929640" y="1990166"/>
+            <a:ext cx="10332720" cy="4867834"/>
           </a:xfrm>
         </p:spPr>
         <p:txBody>
@@ -9360,8 +9872,8 @@
         </p:nvSpPr>
         <p:spPr>
           <a:xfrm>
-            <a:off x="838200" y="1990166"/>
-            <a:ext cx="10515600" cy="4867834"/>
+            <a:off x="929640" y="1990166"/>
+            <a:ext cx="10332720" cy="4867834"/>
           </a:xfrm>
         </p:spPr>
         <p:txBody>
@@ -9431,12 +9943,6 @@
               <a:rPr lang="en-US" dirty="0"/>
               <a:t>Many local authorities integrate FixMyStreet into their internal systems, allowing for automated workflows and streamlined complaint handling.</a:t>
             </a:r>
-          </a:p>
-          <a:p>
-            <a:pPr marL="0" indent="0" algn="just">
-              <a:buNone/>
-            </a:pPr>
-            <a:endParaRPr lang="en-US" dirty="0"/>
           </a:p>
         </p:txBody>
       </p:sp>
@@ -9495,8 +10001,8 @@
         </p:nvSpPr>
         <p:spPr>
           <a:xfrm>
-            <a:off x="838200" y="1150051"/>
-            <a:ext cx="10515600" cy="959083"/>
+            <a:off x="929640" y="1150051"/>
+            <a:ext cx="10332720" cy="959083"/>
           </a:xfrm>
           <a:prstGeom prst="rect">
             <a:avLst/>
@@ -9610,8 +10116,8 @@
         </p:nvSpPr>
         <p:spPr>
           <a:xfrm>
-            <a:off x="838200" y="1346084"/>
-            <a:ext cx="10515600" cy="5511916"/>
+            <a:off x="929640" y="1346084"/>
+            <a:ext cx="10332720" cy="5511916"/>
           </a:xfrm>
         </p:spPr>
         <p:txBody>
@@ -9791,8 +10297,8 @@
         </p:nvSpPr>
         <p:spPr>
           <a:xfrm>
-            <a:off x="838200" y="1990166"/>
-            <a:ext cx="10515600" cy="4867834"/>
+            <a:off x="929640" y="1990166"/>
+            <a:ext cx="10332720" cy="4867834"/>
           </a:xfrm>
         </p:spPr>
         <p:txBody>
@@ -9910,8 +10416,8 @@
         </p:nvSpPr>
         <p:spPr>
           <a:xfrm>
-            <a:off x="838200" y="1150051"/>
-            <a:ext cx="10515600" cy="959083"/>
+            <a:off x="929640" y="1150051"/>
+            <a:ext cx="10332720" cy="959083"/>
           </a:xfrm>
           <a:prstGeom prst="rect">
             <a:avLst/>

</xml_diff>

<commit_message>
Add Scope and Final Outcome of the idea
</commit_message>
<xml_diff>
--- a/4- Idea Evaluation/Idea Evaluation Slides - Working Draft.pptx
+++ b/4- Idea Evaluation/Idea Evaluation Slides - Working Draft.pptx
@@ -5,7 +5,7 @@
     <p:sldMasterId id="2147483648" r:id="rId1"/>
   </p:sldMasterIdLst>
   <p:notesMasterIdLst>
-    <p:notesMasterId r:id="rId32"/>
+    <p:notesMasterId r:id="rId34"/>
   </p:notesMasterIdLst>
   <p:sldIdLst>
     <p:sldId id="258" r:id="rId2"/>
@@ -31,13 +31,15 @@
     <p:sldId id="289" r:id="rId22"/>
     <p:sldId id="290" r:id="rId23"/>
     <p:sldId id="266" r:id="rId24"/>
-    <p:sldId id="267" r:id="rId25"/>
-    <p:sldId id="284" r:id="rId26"/>
-    <p:sldId id="287" r:id="rId27"/>
-    <p:sldId id="286" r:id="rId28"/>
-    <p:sldId id="268" r:id="rId29"/>
-    <p:sldId id="261" r:id="rId30"/>
-    <p:sldId id="269" r:id="rId31"/>
+    <p:sldId id="292" r:id="rId25"/>
+    <p:sldId id="267" r:id="rId26"/>
+    <p:sldId id="284" r:id="rId27"/>
+    <p:sldId id="287" r:id="rId28"/>
+    <p:sldId id="286" r:id="rId29"/>
+    <p:sldId id="268" r:id="rId30"/>
+    <p:sldId id="293" r:id="rId31"/>
+    <p:sldId id="261" r:id="rId32"/>
+    <p:sldId id="269" r:id="rId33"/>
   </p:sldIdLst>
   <p:sldSz cx="12192000" cy="6858000"/>
   <p:notesSz cx="6858000" cy="9144000"/>
@@ -226,7 +228,7 @@
           <a:p>
             <a:fld id="{EF96ACE9-C9FC-4287-B6B2-A985566C0C1D}" type="datetimeFigureOut">
               <a:rPr lang="en-US" smtClean="0"/>
-              <a:t>9/28/2024</a:t>
+              <a:t>9/29/2024</a:t>
             </a:fld>
             <a:endParaRPr lang="en-US"/>
           </a:p>
@@ -790,7 +792,7 @@
           <a:p>
             <a:fld id="{0F5A5E6E-0E5C-41E1-A40C-15B94255FA15}" type="datetimeFigureOut">
               <a:rPr lang="en-US" smtClean="0"/>
-              <a:t>9/28/2024</a:t>
+              <a:t>9/29/2024</a:t>
             </a:fld>
             <a:endParaRPr lang="en-US"/>
           </a:p>
@@ -958,7 +960,7 @@
           <a:p>
             <a:fld id="{0F5A5E6E-0E5C-41E1-A40C-15B94255FA15}" type="datetimeFigureOut">
               <a:rPr lang="en-US" smtClean="0"/>
-              <a:t>9/28/2024</a:t>
+              <a:t>9/29/2024</a:t>
             </a:fld>
             <a:endParaRPr lang="en-US"/>
           </a:p>
@@ -1136,7 +1138,7 @@
           <a:p>
             <a:fld id="{0F5A5E6E-0E5C-41E1-A40C-15B94255FA15}" type="datetimeFigureOut">
               <a:rPr lang="en-US" smtClean="0"/>
-              <a:t>9/28/2024</a:t>
+              <a:t>9/29/2024</a:t>
             </a:fld>
             <a:endParaRPr lang="en-US"/>
           </a:p>
@@ -1304,7 +1306,7 @@
           <a:p>
             <a:fld id="{0F5A5E6E-0E5C-41E1-A40C-15B94255FA15}" type="datetimeFigureOut">
               <a:rPr lang="en-US" smtClean="0"/>
-              <a:t>9/28/2024</a:t>
+              <a:t>9/29/2024</a:t>
             </a:fld>
             <a:endParaRPr lang="en-US"/>
           </a:p>
@@ -1549,7 +1551,7 @@
           <a:p>
             <a:fld id="{0F5A5E6E-0E5C-41E1-A40C-15B94255FA15}" type="datetimeFigureOut">
               <a:rPr lang="en-US" smtClean="0"/>
-              <a:t>9/28/2024</a:t>
+              <a:t>9/29/2024</a:t>
             </a:fld>
             <a:endParaRPr lang="en-US"/>
           </a:p>
@@ -1778,7 +1780,7 @@
           <a:p>
             <a:fld id="{0F5A5E6E-0E5C-41E1-A40C-15B94255FA15}" type="datetimeFigureOut">
               <a:rPr lang="en-US" smtClean="0"/>
-              <a:t>9/28/2024</a:t>
+              <a:t>9/29/2024</a:t>
             </a:fld>
             <a:endParaRPr lang="en-US"/>
           </a:p>
@@ -2142,7 +2144,7 @@
           <a:p>
             <a:fld id="{0F5A5E6E-0E5C-41E1-A40C-15B94255FA15}" type="datetimeFigureOut">
               <a:rPr lang="en-US" smtClean="0"/>
-              <a:t>9/28/2024</a:t>
+              <a:t>9/29/2024</a:t>
             </a:fld>
             <a:endParaRPr lang="en-US"/>
           </a:p>
@@ -2259,7 +2261,7 @@
           <a:p>
             <a:fld id="{0F5A5E6E-0E5C-41E1-A40C-15B94255FA15}" type="datetimeFigureOut">
               <a:rPr lang="en-US" smtClean="0"/>
-              <a:t>9/28/2024</a:t>
+              <a:t>9/29/2024</a:t>
             </a:fld>
             <a:endParaRPr lang="en-US"/>
           </a:p>
@@ -2354,7 +2356,7 @@
           <a:p>
             <a:fld id="{0F5A5E6E-0E5C-41E1-A40C-15B94255FA15}" type="datetimeFigureOut">
               <a:rPr lang="en-US" smtClean="0"/>
-              <a:t>9/28/2024</a:t>
+              <a:t>9/29/2024</a:t>
             </a:fld>
             <a:endParaRPr lang="en-US"/>
           </a:p>
@@ -2629,7 +2631,7 @@
           <a:p>
             <a:fld id="{0F5A5E6E-0E5C-41E1-A40C-15B94255FA15}" type="datetimeFigureOut">
               <a:rPr lang="en-US" smtClean="0"/>
-              <a:t>9/28/2024</a:t>
+              <a:t>9/29/2024</a:t>
             </a:fld>
             <a:endParaRPr lang="en-US"/>
           </a:p>
@@ -2881,7 +2883,7 @@
           <a:p>
             <a:fld id="{0F5A5E6E-0E5C-41E1-A40C-15B94255FA15}" type="datetimeFigureOut">
               <a:rPr lang="en-US" smtClean="0"/>
-              <a:t>9/28/2024</a:t>
+              <a:t>9/29/2024</a:t>
             </a:fld>
             <a:endParaRPr lang="en-US"/>
           </a:p>
@@ -3092,7 +3094,7 @@
           <a:p>
             <a:fld id="{0F5A5E6E-0E5C-41E1-A40C-15B94255FA15}" type="datetimeFigureOut">
               <a:rPr lang="en-US" smtClean="0"/>
-              <a:t>9/28/2024</a:t>
+              <a:t>9/29/2024</a:t>
             </a:fld>
             <a:endParaRPr lang="en-US"/>
           </a:p>
@@ -7209,6 +7211,138 @@
             <p:ph type="title"/>
           </p:nvPr>
         </p:nvSpPr>
+        <p:spPr>
+          <a:xfrm>
+            <a:off x="838200" y="365125"/>
+            <a:ext cx="10515600" cy="980959"/>
+          </a:xfrm>
+        </p:spPr>
+        <p:txBody>
+          <a:bodyPr/>
+          <a:lstStyle/>
+          <a:p>
+            <a:r>
+              <a:rPr lang="en-US" b="1" dirty="0">
+                <a:solidFill>
+                  <a:srgbClr val="36ABF3"/>
+                </a:solidFill>
+              </a:rPr>
+              <a:t>Scope</a:t>
+            </a:r>
+          </a:p>
+        </p:txBody>
+      </p:sp>
+      <p:sp>
+        <p:nvSpPr>
+          <p:cNvPr id="3" name="Content Placeholder 2"/>
+          <p:cNvSpPr>
+            <a:spLocks noGrp="1"/>
+          </p:cNvSpPr>
+          <p:nvPr>
+            <p:ph idx="1"/>
+          </p:nvPr>
+        </p:nvSpPr>
+        <p:spPr>
+          <a:xfrm>
+            <a:off x="929640" y="1506072"/>
+            <a:ext cx="10332720" cy="4867834"/>
+          </a:xfrm>
+        </p:spPr>
+        <p:txBody>
+          <a:bodyPr>
+            <a:normAutofit/>
+          </a:bodyPr>
+          <a:lstStyle/>
+          <a:p>
+            <a:pPr marL="0" indent="0" algn="just">
+              <a:buNone/>
+            </a:pPr>
+            <a:r>
+              <a:rPr lang="en-US" dirty="0"/>
+              <a:t>Constituency Connect aims to streamline communication between constituents and their elected representatives, with a primary emphasis on complaint submission, tracking, and resolution. The system will support virtual meetups and enable performance monitoring of representatives. It will cater to multiple user roles, including constituents, representatives, assistants, and department officials, each with distinct access levels and functionalities. The platform will offer a bilingual interface (English and Urdu), concentrating specifically on complaint management and civic engagement. Features such as external application integration, payment processing, or general-purpose community forums are beyond the scope of the project.</a:t>
+            </a:r>
+          </a:p>
+        </p:txBody>
+      </p:sp>
+      <p:cxnSp>
+        <p:nvCxnSpPr>
+          <p:cNvPr id="10" name="Straight Connector 9">
+            <a:extLst>
+              <a:ext uri="{FF2B5EF4-FFF2-40B4-BE49-F238E27FC236}">
+                <a16:creationId xmlns:a16="http://schemas.microsoft.com/office/drawing/2014/main" id="{5C4D56EA-8905-CAFF-FA8B-91B461D57C36}"/>
+              </a:ext>
+            </a:extLst>
+          </p:cNvPr>
+          <p:cNvCxnSpPr>
+            <a:cxnSpLocks/>
+          </p:cNvCxnSpPr>
+          <p:nvPr/>
+        </p:nvCxnSpPr>
+        <p:spPr>
+          <a:xfrm>
+            <a:off x="929640" y="1237129"/>
+            <a:ext cx="10332720" cy="0"/>
+          </a:xfrm>
+          <a:prstGeom prst="line">
+            <a:avLst/>
+          </a:prstGeom>
+          <a:ln w="28575"/>
+        </p:spPr>
+        <p:style>
+          <a:lnRef idx="3">
+            <a:schemeClr val="dk1"/>
+          </a:lnRef>
+          <a:fillRef idx="0">
+            <a:schemeClr val="dk1"/>
+          </a:fillRef>
+          <a:effectRef idx="2">
+            <a:schemeClr val="dk1"/>
+          </a:effectRef>
+          <a:fontRef idx="minor">
+            <a:schemeClr val="tx1"/>
+          </a:fontRef>
+        </p:style>
+      </p:cxnSp>
+    </p:spTree>
+    <p:extLst>
+      <p:ext uri="{BB962C8B-B14F-4D97-AF65-F5344CB8AC3E}">
+        <p14:creationId xmlns:p14="http://schemas.microsoft.com/office/powerpoint/2010/main" val="297991780"/>
+      </p:ext>
+    </p:extLst>
+  </p:cSld>
+  <p:clrMapOvr>
+    <a:masterClrMapping/>
+  </p:clrMapOvr>
+</p:sld>
+</file>
+
+<file path=ppt/slides/slide25.xml><?xml version="1.0" encoding="utf-8"?>
+<p:sld xmlns:a="http://schemas.openxmlformats.org/drawingml/2006/main" xmlns:r="http://schemas.openxmlformats.org/officeDocument/2006/relationships" xmlns:p="http://schemas.openxmlformats.org/presentationml/2006/main">
+  <p:cSld>
+    <p:spTree>
+      <p:nvGrpSpPr>
+        <p:cNvPr id="1" name=""/>
+        <p:cNvGrpSpPr/>
+        <p:nvPr/>
+      </p:nvGrpSpPr>
+      <p:grpSpPr>
+        <a:xfrm>
+          <a:off x="0" y="0"/>
+          <a:ext cx="0" cy="0"/>
+          <a:chOff x="0" y="0"/>
+          <a:chExt cx="0" cy="0"/>
+        </a:xfrm>
+      </p:grpSpPr>
+      <p:sp>
+        <p:nvSpPr>
+          <p:cNvPr id="2" name="Title 1"/>
+          <p:cNvSpPr>
+            <a:spLocks noGrp="1"/>
+          </p:cNvSpPr>
+          <p:nvPr>
+            <p:ph type="title"/>
+          </p:nvPr>
+        </p:nvSpPr>
         <p:spPr/>
         <p:txBody>
           <a:bodyPr/>
@@ -7263,7 +7397,7 @@
 </p:sld>
 </file>
 
-<file path=ppt/slides/slide25.xml><?xml version="1.0" encoding="utf-8"?>
+<file path=ppt/slides/slide26.xml><?xml version="1.0" encoding="utf-8"?>
 <p:sld xmlns:a="http://schemas.openxmlformats.org/drawingml/2006/main" xmlns:r="http://schemas.openxmlformats.org/officeDocument/2006/relationships" xmlns:p="http://schemas.openxmlformats.org/presentationml/2006/main">
   <p:cSld>
     <p:spTree>
@@ -7770,7 +7904,7 @@
 </p:sld>
 </file>
 
-<file path=ppt/slides/slide26.xml><?xml version="1.0" encoding="utf-8"?>
+<file path=ppt/slides/slide27.xml><?xml version="1.0" encoding="utf-8"?>
 <p:sld xmlns:a="http://schemas.openxmlformats.org/drawingml/2006/main" xmlns:r="http://schemas.openxmlformats.org/officeDocument/2006/relationships" xmlns:p="http://schemas.openxmlformats.org/presentationml/2006/main">
   <p:cSld>
     <p:spTree>
@@ -8334,7 +8468,7 @@
 </p:sld>
 </file>
 
-<file path=ppt/slides/slide27.xml><?xml version="1.0" encoding="utf-8"?>
+<file path=ppt/slides/slide28.xml><?xml version="1.0" encoding="utf-8"?>
 <p:sld xmlns:a="http://schemas.openxmlformats.org/drawingml/2006/main" xmlns:r="http://schemas.openxmlformats.org/officeDocument/2006/relationships" xmlns:p="http://schemas.openxmlformats.org/presentationml/2006/main">
   <p:cSld>
     <p:spTree>
@@ -8730,94 +8864,6 @@
 </p:sld>
 </file>
 
-<file path=ppt/slides/slide28.xml><?xml version="1.0" encoding="utf-8"?>
-<p:sld xmlns:a="http://schemas.openxmlformats.org/drawingml/2006/main" xmlns:r="http://schemas.openxmlformats.org/officeDocument/2006/relationships" xmlns:p="http://schemas.openxmlformats.org/presentationml/2006/main">
-  <p:cSld>
-    <p:spTree>
-      <p:nvGrpSpPr>
-        <p:cNvPr id="1" name=""/>
-        <p:cNvGrpSpPr/>
-        <p:nvPr/>
-      </p:nvGrpSpPr>
-      <p:grpSpPr>
-        <a:xfrm>
-          <a:off x="0" y="0"/>
-          <a:ext cx="0" cy="0"/>
-          <a:chOff x="0" y="0"/>
-          <a:chExt cx="0" cy="0"/>
-        </a:xfrm>
-      </p:grpSpPr>
-      <p:sp>
-        <p:nvSpPr>
-          <p:cNvPr id="2" name="Title 1"/>
-          <p:cNvSpPr>
-            <a:spLocks noGrp="1"/>
-          </p:cNvSpPr>
-          <p:nvPr>
-            <p:ph type="title"/>
-          </p:nvPr>
-        </p:nvSpPr>
-        <p:spPr/>
-        <p:txBody>
-          <a:bodyPr/>
-          <a:lstStyle/>
-          <a:p>
-            <a:r>
-              <a:rPr lang="en-US" b="1" dirty="0">
-                <a:solidFill>
-                  <a:schemeClr val="accent1">
-                    <a:lumMod val="75000"/>
-                  </a:schemeClr>
-                </a:solidFill>
-              </a:rPr>
-              <a:t>Final Outcome</a:t>
-            </a:r>
-          </a:p>
-        </p:txBody>
-      </p:sp>
-      <p:sp>
-        <p:nvSpPr>
-          <p:cNvPr id="3" name="Content Placeholder 2"/>
-          <p:cNvSpPr>
-            <a:spLocks noGrp="1"/>
-          </p:cNvSpPr>
-          <p:nvPr>
-            <p:ph idx="1"/>
-          </p:nvPr>
-        </p:nvSpPr>
-        <p:spPr/>
-        <p:txBody>
-          <a:bodyPr/>
-          <a:lstStyle/>
-          <a:p>
-            <a:pPr algn="just"/>
-            <a:r>
-              <a:rPr lang="en-US" dirty="0"/>
-              <a:t>Describe shortly the nature of your project outcome. </a:t>
-            </a:r>
-          </a:p>
-          <a:p>
-            <a:pPr algn="just"/>
-            <a:r>
-              <a:rPr lang="en-US" dirty="0"/>
-              <a:t>Whether it’s a Advance Technology/ Product / Framework/ Solution to the existing Problem or a novel research, etc. </a:t>
-            </a:r>
-          </a:p>
-        </p:txBody>
-      </p:sp>
-    </p:spTree>
-    <p:extLst>
-      <p:ext uri="{BB962C8B-B14F-4D97-AF65-F5344CB8AC3E}">
-        <p14:creationId xmlns:p14="http://schemas.microsoft.com/office/powerpoint/2010/main" val="1857402067"/>
-      </p:ext>
-    </p:extLst>
-  </p:cSld>
-  <p:clrMapOvr>
-    <a:masterClrMapping/>
-  </p:clrMapOvr>
-</p:sld>
-</file>
-
 <file path=ppt/slides/slide29.xml><?xml version="1.0" encoding="utf-8"?>
 <p:sld xmlns:a="http://schemas.openxmlformats.org/drawingml/2006/main" xmlns:r="http://schemas.openxmlformats.org/officeDocument/2006/relationships" xmlns:p="http://schemas.openxmlformats.org/presentationml/2006/main">
   <p:cSld>
@@ -8858,7 +8904,7 @@
                   </a:schemeClr>
                 </a:solidFill>
               </a:rPr>
-              <a:t>References</a:t>
+              <a:t>Final Outcome</a:t>
             </a:r>
           </a:p>
         </p:txBody>
@@ -8875,54 +8921,20 @@
         </p:nvSpPr>
         <p:spPr/>
         <p:txBody>
-          <a:bodyPr>
-            <a:normAutofit/>
-          </a:bodyPr>
+          <a:bodyPr/>
           <a:lstStyle/>
           <a:p>
-            <a:pPr marL="514350" indent="-514350">
-              <a:buFont typeface="+mj-lt"/>
-              <a:buAutoNum type="arabicPeriod"/>
-            </a:pPr>
-            <a:r>
-              <a:rPr lang="en-US" dirty="0">
-                <a:hlinkClick r:id="rId2"/>
-              </a:rPr>
-              <a:t>www.deeplearning.ai</a:t>
-            </a:r>
+            <a:pPr algn="just"/>
             <a:r>
               <a:rPr lang="en-US" dirty="0"/>
-              <a:t> (Last visit date 13-09-2024)</a:t>
-            </a:r>
-          </a:p>
-          <a:p>
-            <a:pPr marL="514350" indent="-514350">
-              <a:buFont typeface="+mj-lt"/>
-              <a:buAutoNum type="arabicPeriod"/>
-            </a:pPr>
+              <a:t>Describe shortly the nature of your project outcome. </a:t>
+            </a:r>
+          </a:p>
+          <a:p>
+            <a:pPr algn="just"/>
             <a:r>
               <a:rPr lang="en-US" dirty="0"/>
-              <a:t>M. Habib, A. Hussain, S. Rasheed, M. Ali, Adaptive fuzzy inference system based directional median filter for impulse noise removal, AEU - International Journal of Electronics and Communications, 70 (5), 2016, 689-697, </a:t>
-            </a:r>
-            <a:r>
-              <a:rPr lang="en-US" dirty="0">
-                <a:hlinkClick r:id="rId3"/>
-              </a:rPr>
-              <a:t>https://doi.org/10.1016/j.aeue.2016.02.005</a:t>
-            </a:r>
-            <a:r>
-              <a:rPr lang="en-US" dirty="0"/>
-              <a:t>.</a:t>
-            </a:r>
-          </a:p>
-          <a:p>
-            <a:pPr marL="514350" indent="-514350">
-              <a:buFont typeface="+mj-lt"/>
-              <a:buAutoNum type="arabicPeriod"/>
-            </a:pPr>
-            <a:r>
-              <a:rPr lang="en-US" dirty="0"/>
-              <a:t>…</a:t>
+              <a:t>Whether it’s a Advance Technology/ Product / Framework/ Solution to the existing Problem or a novel research, etc. </a:t>
             </a:r>
           </a:p>
         </p:txBody>
@@ -8930,7 +8942,7 @@
     </p:spTree>
     <p:extLst>
       <p:ext uri="{BB962C8B-B14F-4D97-AF65-F5344CB8AC3E}">
-        <p14:creationId xmlns:p14="http://schemas.microsoft.com/office/powerpoint/2010/main" val="2002503975"/>
+        <p14:creationId xmlns:p14="http://schemas.microsoft.com/office/powerpoint/2010/main" val="1857402067"/>
       </p:ext>
     </p:extLst>
   </p:cSld>
@@ -9036,6 +9048,265 @@
 </file>
 
 <file path=ppt/slides/slide30.xml><?xml version="1.0" encoding="utf-8"?>
+<p:sld xmlns:a="http://schemas.openxmlformats.org/drawingml/2006/main" xmlns:r="http://schemas.openxmlformats.org/officeDocument/2006/relationships" xmlns:p="http://schemas.openxmlformats.org/presentationml/2006/main">
+  <p:cSld>
+    <p:spTree>
+      <p:nvGrpSpPr>
+        <p:cNvPr id="1" name=""/>
+        <p:cNvGrpSpPr/>
+        <p:nvPr/>
+      </p:nvGrpSpPr>
+      <p:grpSpPr>
+        <a:xfrm>
+          <a:off x="0" y="0"/>
+          <a:ext cx="0" cy="0"/>
+          <a:chOff x="0" y="0"/>
+          <a:chExt cx="0" cy="0"/>
+        </a:xfrm>
+      </p:grpSpPr>
+      <p:sp>
+        <p:nvSpPr>
+          <p:cNvPr id="2" name="Title 1"/>
+          <p:cNvSpPr>
+            <a:spLocks noGrp="1"/>
+          </p:cNvSpPr>
+          <p:nvPr>
+            <p:ph type="title"/>
+          </p:nvPr>
+        </p:nvSpPr>
+        <p:spPr>
+          <a:xfrm>
+            <a:off x="838200" y="365125"/>
+            <a:ext cx="10515600" cy="980959"/>
+          </a:xfrm>
+        </p:spPr>
+        <p:txBody>
+          <a:bodyPr/>
+          <a:lstStyle/>
+          <a:p>
+            <a:r>
+              <a:rPr lang="en-US" b="1" dirty="0">
+                <a:solidFill>
+                  <a:srgbClr val="36ABF3"/>
+                </a:solidFill>
+              </a:rPr>
+              <a:t>Final Outcome</a:t>
+            </a:r>
+          </a:p>
+        </p:txBody>
+      </p:sp>
+      <p:sp>
+        <p:nvSpPr>
+          <p:cNvPr id="3" name="Content Placeholder 2"/>
+          <p:cNvSpPr>
+            <a:spLocks noGrp="1"/>
+          </p:cNvSpPr>
+          <p:nvPr>
+            <p:ph idx="1"/>
+          </p:nvPr>
+        </p:nvSpPr>
+        <p:spPr>
+          <a:xfrm>
+            <a:off x="929640" y="1506072"/>
+            <a:ext cx="10332720" cy="4867834"/>
+          </a:xfrm>
+        </p:spPr>
+        <p:txBody>
+          <a:bodyPr>
+            <a:normAutofit/>
+          </a:bodyPr>
+          <a:lstStyle/>
+          <a:p>
+            <a:pPr marL="0" indent="0" algn="just">
+              <a:buNone/>
+            </a:pPr>
+            <a:r>
+              <a:rPr lang="en-US" dirty="0"/>
+              <a:t>Constituency Connect is a targeted solution designed to improve communication between citizens and their elected representatives. The platform tackles existing communication inefficiencies by facilitating  real-time interactions, complaint submissions, tracking, and transparent monitoring of representative performance, all while streamlining complaint management and providing tools for virtual meetings. With real-time notifications and role-specific access, it promotes transparency, accountability, and increased civic engagement. This platform effectively addresses existing gaps by offering an efficient solution for complaint management, empowering both constituents and representatives to engage more meaningfully and enhance civic </a:t>
+            </a:r>
+            <a:r>
+              <a:rPr lang="en-US"/>
+              <a:t>participation.</a:t>
+            </a:r>
+            <a:endParaRPr lang="en-US" dirty="0"/>
+          </a:p>
+        </p:txBody>
+      </p:sp>
+      <p:cxnSp>
+        <p:nvCxnSpPr>
+          <p:cNvPr id="10" name="Straight Connector 9">
+            <a:extLst>
+              <a:ext uri="{FF2B5EF4-FFF2-40B4-BE49-F238E27FC236}">
+                <a16:creationId xmlns:a16="http://schemas.microsoft.com/office/drawing/2014/main" id="{5C4D56EA-8905-CAFF-FA8B-91B461D57C36}"/>
+              </a:ext>
+            </a:extLst>
+          </p:cNvPr>
+          <p:cNvCxnSpPr>
+            <a:cxnSpLocks/>
+          </p:cNvCxnSpPr>
+          <p:nvPr/>
+        </p:nvCxnSpPr>
+        <p:spPr>
+          <a:xfrm>
+            <a:off x="929640" y="1237129"/>
+            <a:ext cx="10332720" cy="0"/>
+          </a:xfrm>
+          <a:prstGeom prst="line">
+            <a:avLst/>
+          </a:prstGeom>
+          <a:ln w="28575"/>
+        </p:spPr>
+        <p:style>
+          <a:lnRef idx="3">
+            <a:schemeClr val="dk1"/>
+          </a:lnRef>
+          <a:fillRef idx="0">
+            <a:schemeClr val="dk1"/>
+          </a:fillRef>
+          <a:effectRef idx="2">
+            <a:schemeClr val="dk1"/>
+          </a:effectRef>
+          <a:fontRef idx="minor">
+            <a:schemeClr val="tx1"/>
+          </a:fontRef>
+        </p:style>
+      </p:cxnSp>
+    </p:spTree>
+    <p:extLst>
+      <p:ext uri="{BB962C8B-B14F-4D97-AF65-F5344CB8AC3E}">
+        <p14:creationId xmlns:p14="http://schemas.microsoft.com/office/powerpoint/2010/main" val="1805584868"/>
+      </p:ext>
+    </p:extLst>
+  </p:cSld>
+  <p:clrMapOvr>
+    <a:masterClrMapping/>
+  </p:clrMapOvr>
+</p:sld>
+</file>
+
+<file path=ppt/slides/slide31.xml><?xml version="1.0" encoding="utf-8"?>
+<p:sld xmlns:a="http://schemas.openxmlformats.org/drawingml/2006/main" xmlns:r="http://schemas.openxmlformats.org/officeDocument/2006/relationships" xmlns:p="http://schemas.openxmlformats.org/presentationml/2006/main">
+  <p:cSld>
+    <p:spTree>
+      <p:nvGrpSpPr>
+        <p:cNvPr id="1" name=""/>
+        <p:cNvGrpSpPr/>
+        <p:nvPr/>
+      </p:nvGrpSpPr>
+      <p:grpSpPr>
+        <a:xfrm>
+          <a:off x="0" y="0"/>
+          <a:ext cx="0" cy="0"/>
+          <a:chOff x="0" y="0"/>
+          <a:chExt cx="0" cy="0"/>
+        </a:xfrm>
+      </p:grpSpPr>
+      <p:sp>
+        <p:nvSpPr>
+          <p:cNvPr id="2" name="Title 1"/>
+          <p:cNvSpPr>
+            <a:spLocks noGrp="1"/>
+          </p:cNvSpPr>
+          <p:nvPr>
+            <p:ph type="title"/>
+          </p:nvPr>
+        </p:nvSpPr>
+        <p:spPr/>
+        <p:txBody>
+          <a:bodyPr/>
+          <a:lstStyle/>
+          <a:p>
+            <a:r>
+              <a:rPr lang="en-US" b="1" dirty="0">
+                <a:solidFill>
+                  <a:schemeClr val="accent1">
+                    <a:lumMod val="75000"/>
+                  </a:schemeClr>
+                </a:solidFill>
+              </a:rPr>
+              <a:t>References</a:t>
+            </a:r>
+          </a:p>
+        </p:txBody>
+      </p:sp>
+      <p:sp>
+        <p:nvSpPr>
+          <p:cNvPr id="3" name="Content Placeholder 2"/>
+          <p:cNvSpPr>
+            <a:spLocks noGrp="1"/>
+          </p:cNvSpPr>
+          <p:nvPr>
+            <p:ph idx="1"/>
+          </p:nvPr>
+        </p:nvSpPr>
+        <p:spPr/>
+        <p:txBody>
+          <a:bodyPr>
+            <a:normAutofit/>
+          </a:bodyPr>
+          <a:lstStyle/>
+          <a:p>
+            <a:pPr marL="514350" indent="-514350">
+              <a:buFont typeface="+mj-lt"/>
+              <a:buAutoNum type="arabicPeriod"/>
+            </a:pPr>
+            <a:r>
+              <a:rPr lang="en-US" dirty="0">
+                <a:hlinkClick r:id="rId2"/>
+              </a:rPr>
+              <a:t>www.deeplearning.ai</a:t>
+            </a:r>
+            <a:r>
+              <a:rPr lang="en-US" dirty="0"/>
+              <a:t> (Last visit date 13-09-2024)</a:t>
+            </a:r>
+          </a:p>
+          <a:p>
+            <a:pPr marL="514350" indent="-514350">
+              <a:buFont typeface="+mj-lt"/>
+              <a:buAutoNum type="arabicPeriod"/>
+            </a:pPr>
+            <a:r>
+              <a:rPr lang="en-US" dirty="0"/>
+              <a:t>M. Habib, A. Hussain, S. Rasheed, M. Ali, Adaptive fuzzy inference system based directional median filter for impulse noise removal, AEU - International Journal of Electronics and Communications, 70 (5), 2016, 689-697, </a:t>
+            </a:r>
+            <a:r>
+              <a:rPr lang="en-US" dirty="0">
+                <a:hlinkClick r:id="rId3"/>
+              </a:rPr>
+              <a:t>https://doi.org/10.1016/j.aeue.2016.02.005</a:t>
+            </a:r>
+            <a:r>
+              <a:rPr lang="en-US" dirty="0"/>
+              <a:t>.</a:t>
+            </a:r>
+          </a:p>
+          <a:p>
+            <a:pPr marL="514350" indent="-514350">
+              <a:buFont typeface="+mj-lt"/>
+              <a:buAutoNum type="arabicPeriod"/>
+            </a:pPr>
+            <a:r>
+              <a:rPr lang="en-US" dirty="0"/>
+              <a:t>…</a:t>
+            </a:r>
+          </a:p>
+        </p:txBody>
+      </p:sp>
+    </p:spTree>
+    <p:extLst>
+      <p:ext uri="{BB962C8B-B14F-4D97-AF65-F5344CB8AC3E}">
+        <p14:creationId xmlns:p14="http://schemas.microsoft.com/office/powerpoint/2010/main" val="2002503975"/>
+      </p:ext>
+    </p:extLst>
+  </p:cSld>
+  <p:clrMapOvr>
+    <a:masterClrMapping/>
+  </p:clrMapOvr>
+</p:sld>
+</file>
+
+<file path=ppt/slides/slide32.xml><?xml version="1.0" encoding="utf-8"?>
 <p:sld xmlns:a="http://schemas.openxmlformats.org/drawingml/2006/main" xmlns:r="http://schemas.openxmlformats.org/officeDocument/2006/relationships" xmlns:p="http://schemas.openxmlformats.org/presentationml/2006/main">
   <p:cSld>
     <p:spTree>
@@ -9449,10 +9720,7 @@
               </a:rPr>
               <a:t>Idea</a:t>
             </a:r>
-            <a:r>
-              <a:rPr lang="en-US" sz="3600" b="1" dirty="0"/>
-              <a:t>:</a:t>
-            </a:r>
+            <a:endParaRPr lang="en-US" sz="3600" b="1" dirty="0"/>
           </a:p>
         </p:txBody>
       </p:sp>
@@ -9706,7 +9974,7 @@
                   <a:srgbClr val="F8981C"/>
                 </a:solidFill>
               </a:rPr>
-              <a:t>Key Features:</a:t>
+              <a:t>Key Features</a:t>
             </a:r>
           </a:p>
         </p:txBody>

</xml_diff>